<commit_message>
Úprava prezentace, oprava překlipů, smazání jmen
</commit_message>
<xml_diff>
--- a/prez/Macejovsky_Pardubicky_prez.pptx
+++ b/prez/Macejovsky_Pardubicky_prez.pptx
@@ -30,27 +30,34 @@
   <p:notesSz cx="6858000" cy="9144000"/>
   <p:embeddedFontLst>
     <p:embeddedFont>
-      <p:font typeface="Lucida Sans Unicode" pitchFamily="34" charset="0"/>
+      <p:font typeface="Lucida Sans Unicode" panose="020B0602030504020204" pitchFamily="34" charset="0"/>
       <p:regular r:id="rId20"/>
     </p:embeddedFont>
     <p:embeddedFont>
-      <p:font typeface="Wingdings 3" pitchFamily="18" charset="2"/>
+      <p:font typeface="Satisfy" panose="020B0604020202020204" charset="0"/>
       <p:regular r:id="rId21"/>
     </p:embeddedFont>
     <p:embeddedFont>
-      <p:font typeface="Verdana" pitchFamily="34" charset="0"/>
+      <p:font typeface="Ubuntu" panose="020B0504030602030204" pitchFamily="34" charset="0"/>
       <p:regular r:id="rId22"/>
       <p:bold r:id="rId23"/>
       <p:italic r:id="rId24"/>
       <p:boldItalic r:id="rId25"/>
     </p:embeddedFont>
     <p:embeddedFont>
-      <p:font typeface="Wingdings 2" pitchFamily="18" charset="2"/>
+      <p:font typeface="Verdana" panose="020B0604030504040204" pitchFamily="34" charset="0"/>
       <p:regular r:id="rId26"/>
+      <p:bold r:id="rId27"/>
+      <p:italic r:id="rId28"/>
+      <p:boldItalic r:id="rId29"/>
     </p:embeddedFont>
     <p:embeddedFont>
-      <p:font typeface="Satisfy" charset="0"/>
-      <p:regular r:id="rId27"/>
+      <p:font typeface="Wingdings 2" panose="05020102010507070707" pitchFamily="18" charset="2"/>
+      <p:regular r:id="rId30"/>
+    </p:embeddedFont>
+    <p:embeddedFont>
+      <p:font typeface="Wingdings 3" panose="05040102010807070707" pitchFamily="18" charset="2"/>
+      <p:regular r:id="rId31"/>
     </p:embeddedFont>
   </p:embeddedFontLst>
   <p:defaultTextStyle>
@@ -282,7 +289,199 @@
       </a:defRPr>
     </a:lvl9pPr>
   </p:defaultTextStyle>
+  <p:extLst>
+    <p:ext uri="{EFAFB233-063F-42B5-8137-9DF3F51BA10A}">
+      <p15:sldGuideLst xmlns:p15="http://schemas.microsoft.com/office/powerpoint/2012/main">
+        <p15:guide id="1" orient="horz" pos="1620">
+          <p15:clr>
+            <a:srgbClr val="A4A3A4"/>
+          </p15:clr>
+        </p15:guide>
+        <p15:guide id="2" pos="2880">
+          <p15:clr>
+            <a:srgbClr val="A4A3A4"/>
+          </p15:clr>
+        </p15:guide>
+      </p15:sldGuideLst>
+    </p:ext>
+  </p:extLst>
 </p:presentation>
+</file>
+
+<file path=ppt/changesInfos/changesInfo1.xml><?xml version="1.0" encoding="utf-8"?>
+<pc:chgInfo xmlns:a="http://schemas.openxmlformats.org/drawingml/2006/main" xmlns:r="http://schemas.openxmlformats.org/officeDocument/2006/relationships" xmlns:ac="http://schemas.microsoft.com/office/drawing/2013/main/command" xmlns:pc="http://schemas.microsoft.com/office/powerpoint/2013/main/command">
+  <pc:docChgLst>
+    <pc:chgData name="Stepan Pardubicky" userId="08e5f0ab36d1dc46" providerId="LiveId" clId="{86FFC6CC-199F-4968-BFDC-609DD14A5703}"/>
+    <pc:docChg chg="custSel modSld">
+      <pc:chgData name="Stepan Pardubicky" userId="08e5f0ab36d1dc46" providerId="LiveId" clId="{86FFC6CC-199F-4968-BFDC-609DD14A5703}" dt="2024-01-10T22:46:30.139" v="271" actId="1076"/>
+      <pc:docMkLst>
+        <pc:docMk/>
+      </pc:docMkLst>
+      <pc:sldChg chg="delSp modSp mod">
+        <pc:chgData name="Stepan Pardubicky" userId="08e5f0ab36d1dc46" providerId="LiveId" clId="{86FFC6CC-199F-4968-BFDC-609DD14A5703}" dt="2024-01-10T22:46:30.139" v="271" actId="1076"/>
+        <pc:sldMkLst>
+          <pc:docMk/>
+          <pc:sldMk cId="0" sldId="311"/>
+        </pc:sldMkLst>
+        <pc:spChg chg="mod">
+          <ac:chgData name="Stepan Pardubicky" userId="08e5f0ab36d1dc46" providerId="LiveId" clId="{86FFC6CC-199F-4968-BFDC-609DD14A5703}" dt="2024-01-10T22:14:36.501" v="51" actId="20577"/>
+          <ac:spMkLst>
+            <pc:docMk/>
+            <pc:sldMk cId="0" sldId="311"/>
+            <ac:spMk id="2" creationId="{00000000-0000-0000-0000-000000000000}"/>
+          </ac:spMkLst>
+        </pc:spChg>
+        <pc:spChg chg="del">
+          <ac:chgData name="Stepan Pardubicky" userId="08e5f0ab36d1dc46" providerId="LiveId" clId="{86FFC6CC-199F-4968-BFDC-609DD14A5703}" dt="2024-01-10T22:46:12.001" v="266" actId="478"/>
+          <ac:spMkLst>
+            <pc:docMk/>
+            <pc:sldMk cId="0" sldId="311"/>
+            <ac:spMk id="4" creationId="{00000000-0000-0000-0000-000000000000}"/>
+          </ac:spMkLst>
+        </pc:spChg>
+        <pc:picChg chg="mod">
+          <ac:chgData name="Stepan Pardubicky" userId="08e5f0ab36d1dc46" providerId="LiveId" clId="{86FFC6CC-199F-4968-BFDC-609DD14A5703}" dt="2024-01-10T22:46:30.139" v="271" actId="1076"/>
+          <ac:picMkLst>
+            <pc:docMk/>
+            <pc:sldMk cId="0" sldId="311"/>
+            <ac:picMk id="5" creationId="{00000000-0000-0000-0000-000000000000}"/>
+          </ac:picMkLst>
+        </pc:picChg>
+      </pc:sldChg>
+      <pc:sldChg chg="delSp modSp mod">
+        <pc:chgData name="Stepan Pardubicky" userId="08e5f0ab36d1dc46" providerId="LiveId" clId="{86FFC6CC-199F-4968-BFDC-609DD14A5703}" dt="2024-01-10T22:20:20.156" v="90" actId="5793"/>
+        <pc:sldMkLst>
+          <pc:docMk/>
+          <pc:sldMk cId="0" sldId="312"/>
+        </pc:sldMkLst>
+        <pc:spChg chg="mod">
+          <ac:chgData name="Stepan Pardubicky" userId="08e5f0ab36d1dc46" providerId="LiveId" clId="{86FFC6CC-199F-4968-BFDC-609DD14A5703}" dt="2024-01-10T22:20:20.156" v="90" actId="5793"/>
+          <ac:spMkLst>
+            <pc:docMk/>
+            <pc:sldMk cId="0" sldId="312"/>
+            <ac:spMk id="2" creationId="{00000000-0000-0000-0000-000000000000}"/>
+          </ac:spMkLst>
+        </pc:spChg>
+        <pc:spChg chg="del mod">
+          <ac:chgData name="Stepan Pardubicky" userId="08e5f0ab36d1dc46" providerId="LiveId" clId="{86FFC6CC-199F-4968-BFDC-609DD14A5703}" dt="2024-01-10T22:15:32.718" v="88" actId="478"/>
+          <ac:spMkLst>
+            <pc:docMk/>
+            <pc:sldMk cId="0" sldId="312"/>
+            <ac:spMk id="4" creationId="{00000000-0000-0000-0000-000000000000}"/>
+          </ac:spMkLst>
+        </pc:spChg>
+      </pc:sldChg>
+      <pc:sldChg chg="delSp modSp mod">
+        <pc:chgData name="Stepan Pardubicky" userId="08e5f0ab36d1dc46" providerId="LiveId" clId="{86FFC6CC-199F-4968-BFDC-609DD14A5703}" dt="2024-01-10T22:27:14.099" v="94" actId="20577"/>
+        <pc:sldMkLst>
+          <pc:docMk/>
+          <pc:sldMk cId="0" sldId="316"/>
+        </pc:sldMkLst>
+        <pc:spChg chg="mod">
+          <ac:chgData name="Stepan Pardubicky" userId="08e5f0ab36d1dc46" providerId="LiveId" clId="{86FFC6CC-199F-4968-BFDC-609DD14A5703}" dt="2024-01-10T22:27:14.099" v="94" actId="20577"/>
+          <ac:spMkLst>
+            <pc:docMk/>
+            <pc:sldMk cId="0" sldId="316"/>
+            <ac:spMk id="2" creationId="{00000000-0000-0000-0000-000000000000}"/>
+          </ac:spMkLst>
+        </pc:spChg>
+        <pc:spChg chg="del">
+          <ac:chgData name="Stepan Pardubicky" userId="08e5f0ab36d1dc46" providerId="LiveId" clId="{86FFC6CC-199F-4968-BFDC-609DD14A5703}" dt="2024-01-10T22:22:13.592" v="91" actId="478"/>
+          <ac:spMkLst>
+            <pc:docMk/>
+            <pc:sldMk cId="0" sldId="316"/>
+            <ac:spMk id="4" creationId="{00000000-0000-0000-0000-000000000000}"/>
+          </ac:spMkLst>
+        </pc:spChg>
+        <pc:picChg chg="mod">
+          <ac:chgData name="Stepan Pardubicky" userId="08e5f0ab36d1dc46" providerId="LiveId" clId="{86FFC6CC-199F-4968-BFDC-609DD14A5703}" dt="2024-01-10T22:22:23.677" v="93" actId="1076"/>
+          <ac:picMkLst>
+            <pc:docMk/>
+            <pc:sldMk cId="0" sldId="316"/>
+            <ac:picMk id="5" creationId="{00000000-0000-0000-0000-000000000000}"/>
+          </ac:picMkLst>
+        </pc:picChg>
+      </pc:sldChg>
+      <pc:sldChg chg="delSp modSp mod">
+        <pc:chgData name="Stepan Pardubicky" userId="08e5f0ab36d1dc46" providerId="LiveId" clId="{86FFC6CC-199F-4968-BFDC-609DD14A5703}" dt="2024-01-10T22:29:07.979" v="125" actId="20577"/>
+        <pc:sldMkLst>
+          <pc:docMk/>
+          <pc:sldMk cId="0" sldId="319"/>
+        </pc:sldMkLst>
+        <pc:spChg chg="mod">
+          <ac:chgData name="Stepan Pardubicky" userId="08e5f0ab36d1dc46" providerId="LiveId" clId="{86FFC6CC-199F-4968-BFDC-609DD14A5703}" dt="2024-01-10T22:29:07.979" v="125" actId="20577"/>
+          <ac:spMkLst>
+            <pc:docMk/>
+            <pc:sldMk cId="0" sldId="319"/>
+            <ac:spMk id="2" creationId="{00000000-0000-0000-0000-000000000000}"/>
+          </ac:spMkLst>
+        </pc:spChg>
+        <pc:spChg chg="del mod">
+          <ac:chgData name="Stepan Pardubicky" userId="08e5f0ab36d1dc46" providerId="LiveId" clId="{86FFC6CC-199F-4968-BFDC-609DD14A5703}" dt="2024-01-10T22:28:37.386" v="102"/>
+          <ac:spMkLst>
+            <pc:docMk/>
+            <pc:sldMk cId="0" sldId="319"/>
+            <ac:spMk id="4" creationId="{00000000-0000-0000-0000-000000000000}"/>
+          </ac:spMkLst>
+        </pc:spChg>
+        <pc:picChg chg="mod">
+          <ac:chgData name="Stepan Pardubicky" userId="08e5f0ab36d1dc46" providerId="LiveId" clId="{86FFC6CC-199F-4968-BFDC-609DD14A5703}" dt="2024-01-10T22:28:44.795" v="103" actId="1076"/>
+          <ac:picMkLst>
+            <pc:docMk/>
+            <pc:sldMk cId="0" sldId="319"/>
+            <ac:picMk id="5" creationId="{00000000-0000-0000-0000-000000000000}"/>
+          </ac:picMkLst>
+        </pc:picChg>
+      </pc:sldChg>
+      <pc:sldChg chg="delSp modSp mod">
+        <pc:chgData name="Stepan Pardubicky" userId="08e5f0ab36d1dc46" providerId="LiveId" clId="{86FFC6CC-199F-4968-BFDC-609DD14A5703}" dt="2024-01-10T22:36:15.515" v="161" actId="478"/>
+        <pc:sldMkLst>
+          <pc:docMk/>
+          <pc:sldMk cId="0" sldId="321"/>
+        </pc:sldMkLst>
+        <pc:spChg chg="mod">
+          <ac:chgData name="Stepan Pardubicky" userId="08e5f0ab36d1dc46" providerId="LiveId" clId="{86FFC6CC-199F-4968-BFDC-609DD14A5703}" dt="2024-01-10T22:36:06.445" v="159" actId="5793"/>
+          <ac:spMkLst>
+            <pc:docMk/>
+            <pc:sldMk cId="0" sldId="321"/>
+            <ac:spMk id="2" creationId="{00000000-0000-0000-0000-000000000000}"/>
+          </ac:spMkLst>
+        </pc:spChg>
+        <pc:spChg chg="del mod">
+          <ac:chgData name="Stepan Pardubicky" userId="08e5f0ab36d1dc46" providerId="LiveId" clId="{86FFC6CC-199F-4968-BFDC-609DD14A5703}" dt="2024-01-10T22:36:15.515" v="161" actId="478"/>
+          <ac:spMkLst>
+            <pc:docMk/>
+            <pc:sldMk cId="0" sldId="321"/>
+            <ac:spMk id="4" creationId="{00000000-0000-0000-0000-000000000000}"/>
+          </ac:spMkLst>
+        </pc:spChg>
+      </pc:sldChg>
+      <pc:sldChg chg="delSp modSp mod">
+        <pc:chgData name="Stepan Pardubicky" userId="08e5f0ab36d1dc46" providerId="LiveId" clId="{86FFC6CC-199F-4968-BFDC-609DD14A5703}" dt="2024-01-10T22:45:37.115" v="265"/>
+        <pc:sldMkLst>
+          <pc:docMk/>
+          <pc:sldMk cId="0" sldId="323"/>
+        </pc:sldMkLst>
+        <pc:spChg chg="mod">
+          <ac:chgData name="Stepan Pardubicky" userId="08e5f0ab36d1dc46" providerId="LiveId" clId="{86FFC6CC-199F-4968-BFDC-609DD14A5703}" dt="2024-01-10T22:39:08.084" v="257" actId="20577"/>
+          <ac:spMkLst>
+            <pc:docMk/>
+            <pc:sldMk cId="0" sldId="323"/>
+            <ac:spMk id="2" creationId="{00000000-0000-0000-0000-000000000000}"/>
+          </ac:spMkLst>
+        </pc:spChg>
+        <pc:spChg chg="del mod">
+          <ac:chgData name="Stepan Pardubicky" userId="08e5f0ab36d1dc46" providerId="LiveId" clId="{86FFC6CC-199F-4968-BFDC-609DD14A5703}" dt="2024-01-10T22:45:37.115" v="265"/>
+          <ac:spMkLst>
+            <pc:docMk/>
+            <pc:sldMk cId="0" sldId="323"/>
+            <ac:spMk id="4" creationId="{00000000-0000-0000-0000-000000000000}"/>
+          </ac:spMkLst>
+        </pc:spChg>
+      </pc:sldChg>
+    </pc:docChg>
+  </pc:docChgLst>
+</pc:chgInfo>
 </file>
 
 <file path=ppt/notesMasters/notesMaster1.xml><?xml version="1.0" encoding="utf-8"?>
@@ -1014,9 +1213,7 @@
         </p:style>
         <p:txBody>
           <a:bodyPr anchor="ctr"/>
-          <a:lstStyle>
-            <a:extLst/>
-          </a:lstStyle>
+          <a:lstStyle/>
           <a:p>
             <a:pPr algn="ctr" eaLnBrk="1" latinLnBrk="0" hangingPunct="1"/>
             <a:endParaRPr kumimoji="0" lang="en-US"/>
@@ -1069,7 +1266,7 @@
           </a:lstStyle>
           <a:p>
             <a:r>
-              <a:rPr kumimoji="0" lang="sk-SK" smtClean="0"/>
+              <a:rPr kumimoji="0" lang="sk-SK"/>
               <a:t>Kliknite sem a upravte štýl predlohy nadpisov.</a:t>
             </a:r>
             <a:endParaRPr kumimoji="0" lang="en-US"/>
@@ -1131,7 +1328,7 @@
           </a:lstStyle>
           <a:p>
             <a:r>
-              <a:rPr kumimoji="0" lang="sk-SK" smtClean="0"/>
+              <a:rPr kumimoji="0" lang="sk-SK"/>
               <a:t>Kliknite sem a upravte štýl predlohy podnadpisov.</a:t>
             </a:r>
             <a:endParaRPr kumimoji="0" lang="en-US"/>
@@ -1229,9 +1426,7 @@
           </p:spPr>
           <p:txBody>
             <a:bodyPr vert="horz" wrap="square" lIns="91440" tIns="45720" rIns="91440" bIns="45720" anchor="t" compatLnSpc="1"/>
-            <a:lstStyle>
-              <a:extLst/>
-            </a:lstStyle>
+            <a:lstStyle/>
             <a:p>
               <a:endParaRPr kumimoji="0" lang="en-US"/>
             </a:p>
@@ -1311,9 +1506,7 @@
           </p:spPr>
           <p:txBody>
             <a:bodyPr vert="horz" wrap="square" lIns="91440" tIns="45720" rIns="91440" bIns="45720" anchor="t" compatLnSpc="1"/>
-            <a:lstStyle>
-              <a:extLst/>
-            </a:lstStyle>
+            <a:lstStyle/>
             <a:p>
               <a:endParaRPr kumimoji="0" lang="en-US"/>
             </a:p>
@@ -1470,9 +1663,7 @@
           </p:style>
           <p:txBody>
             <a:bodyPr vert="horz" wrap="square" lIns="91440" tIns="45720" rIns="91440" bIns="45720" anchor="ctr" compatLnSpc="1"/>
-            <a:lstStyle>
-              <a:extLst/>
-            </a:lstStyle>
+            <a:lstStyle/>
             <a:p>
               <a:pPr algn="ctr" eaLnBrk="1" latinLnBrk="0" hangingPunct="1"/>
               <a:endParaRPr kumimoji="0" lang="en-US"/>
@@ -1682,12 +1873,10 @@
         <p:spPr/>
         <p:txBody>
           <a:bodyPr/>
-          <a:lstStyle>
-            <a:extLst/>
-          </a:lstStyle>
-          <a:p>
-            <a:r>
-              <a:rPr kumimoji="0" lang="sk-SK" smtClean="0"/>
+          <a:lstStyle/>
+          <a:p>
+            <a:r>
+              <a:rPr kumimoji="0" lang="sk-SK"/>
               <a:t>Kliknite sem a upravte štýl predlohy nadpisov.</a:t>
             </a:r>
             <a:endParaRPr kumimoji="0" lang="en-US"/>
@@ -1712,41 +1901,39 @@
         </p:spPr>
         <p:txBody>
           <a:bodyPr vert="eaVert"/>
-          <a:lstStyle>
-            <a:extLst/>
-          </a:lstStyle>
+          <a:lstStyle/>
           <a:p>
             <a:pPr lvl="0" eaLnBrk="1" latinLnBrk="0" hangingPunct="1"/>
             <a:r>
-              <a:rPr lang="sk-SK" smtClean="0"/>
+              <a:rPr lang="sk-SK"/>
               <a:t>Kliknite sem a upravte štýly predlohy textu.</a:t>
             </a:r>
           </a:p>
           <a:p>
             <a:pPr lvl="1" eaLnBrk="1" latinLnBrk="0" hangingPunct="1"/>
             <a:r>
-              <a:rPr lang="sk-SK" smtClean="0"/>
+              <a:rPr lang="sk-SK"/>
               <a:t>Druhá úroveň</a:t>
             </a:r>
           </a:p>
           <a:p>
             <a:pPr lvl="2" eaLnBrk="1" latinLnBrk="0" hangingPunct="1"/>
             <a:r>
-              <a:rPr lang="sk-SK" smtClean="0"/>
+              <a:rPr lang="sk-SK"/>
               <a:t>Tretia úroveň</a:t>
             </a:r>
           </a:p>
           <a:p>
             <a:pPr lvl="3" eaLnBrk="1" latinLnBrk="0" hangingPunct="1"/>
             <a:r>
-              <a:rPr lang="sk-SK" smtClean="0"/>
+              <a:rPr lang="sk-SK"/>
               <a:t>Štvrtá úroveň</a:t>
             </a:r>
           </a:p>
           <a:p>
             <a:pPr lvl="4" eaLnBrk="1" latinLnBrk="0" hangingPunct="1"/>
             <a:r>
-              <a:rPr lang="sk-SK" smtClean="0"/>
+              <a:rPr lang="sk-SK"/>
               <a:t>Piata úroveň</a:t>
             </a:r>
             <a:endParaRPr kumimoji="0" lang="en-US"/>
@@ -1766,9 +1953,7 @@
         <p:spPr/>
         <p:txBody>
           <a:bodyPr/>
-          <a:lstStyle>
-            <a:extLst/>
-          </a:lstStyle>
+          <a:lstStyle/>
           <a:p>
             <a:fld id="{544213AF-26F6-41FA-8D85-E2C5388D6E58}" type="datetimeFigureOut">
               <a:rPr lang="en-US" smtClean="0"/>
@@ -1792,9 +1977,7 @@
         <p:spPr/>
         <p:txBody>
           <a:bodyPr/>
-          <a:lstStyle>
-            <a:extLst/>
-          </a:lstStyle>
+          <a:lstStyle/>
           <a:p>
             <a:endParaRPr kumimoji="0" lang="en-US"/>
           </a:p>
@@ -1813,9 +1996,7 @@
         <p:spPr/>
         <p:txBody>
           <a:bodyPr/>
-          <a:lstStyle>
-            <a:extLst/>
-          </a:lstStyle>
+          <a:lstStyle/>
           <a:p>
             <a:fld id="{D5BBC35B-A44B-4119-B8DA-DE9E3DFADA20}" type="slidenum">
               <a:rPr kumimoji="0" lang="en-US" smtClean="0"/>
@@ -1870,12 +2051,10 @@
         </p:spPr>
         <p:txBody>
           <a:bodyPr vert="eaVert"/>
-          <a:lstStyle>
-            <a:extLst/>
-          </a:lstStyle>
-          <a:p>
-            <a:r>
-              <a:rPr kumimoji="0" lang="sk-SK" smtClean="0"/>
+          <a:lstStyle/>
+          <a:p>
+            <a:r>
+              <a:rPr kumimoji="0" lang="sk-SK"/>
               <a:t>Kliknite sem a upravte štýl predlohy nadpisov.</a:t>
             </a:r>
             <a:endParaRPr kumimoji="0" lang="en-US"/>
@@ -1900,41 +2079,39 @@
         </p:spPr>
         <p:txBody>
           <a:bodyPr vert="eaVert"/>
-          <a:lstStyle>
-            <a:extLst/>
-          </a:lstStyle>
+          <a:lstStyle/>
           <a:p>
             <a:pPr lvl="0" eaLnBrk="1" latinLnBrk="0" hangingPunct="1"/>
             <a:r>
-              <a:rPr lang="sk-SK" smtClean="0"/>
+              <a:rPr lang="sk-SK"/>
               <a:t>Kliknite sem a upravte štýly predlohy textu.</a:t>
             </a:r>
           </a:p>
           <a:p>
             <a:pPr lvl="1" eaLnBrk="1" latinLnBrk="0" hangingPunct="1"/>
             <a:r>
-              <a:rPr lang="sk-SK" smtClean="0"/>
+              <a:rPr lang="sk-SK"/>
               <a:t>Druhá úroveň</a:t>
             </a:r>
           </a:p>
           <a:p>
             <a:pPr lvl="2" eaLnBrk="1" latinLnBrk="0" hangingPunct="1"/>
             <a:r>
-              <a:rPr lang="sk-SK" smtClean="0"/>
+              <a:rPr lang="sk-SK"/>
               <a:t>Tretia úroveň</a:t>
             </a:r>
           </a:p>
           <a:p>
             <a:pPr lvl="3" eaLnBrk="1" latinLnBrk="0" hangingPunct="1"/>
             <a:r>
-              <a:rPr lang="sk-SK" smtClean="0"/>
+              <a:rPr lang="sk-SK"/>
               <a:t>Štvrtá úroveň</a:t>
             </a:r>
           </a:p>
           <a:p>
             <a:pPr lvl="4" eaLnBrk="1" latinLnBrk="0" hangingPunct="1"/>
             <a:r>
-              <a:rPr lang="sk-SK" smtClean="0"/>
+              <a:rPr lang="sk-SK"/>
               <a:t>Piata úroveň</a:t>
             </a:r>
             <a:endParaRPr kumimoji="0" lang="en-US"/>
@@ -1954,9 +2131,7 @@
         <p:spPr/>
         <p:txBody>
           <a:bodyPr/>
-          <a:lstStyle>
-            <a:extLst/>
-          </a:lstStyle>
+          <a:lstStyle/>
           <a:p>
             <a:fld id="{544213AF-26F6-41FA-8D85-E2C5388D6E58}" type="datetimeFigureOut">
               <a:rPr lang="en-US" smtClean="0"/>
@@ -1980,9 +2155,7 @@
         <p:spPr/>
         <p:txBody>
           <a:bodyPr/>
-          <a:lstStyle>
-            <a:extLst/>
-          </a:lstStyle>
+          <a:lstStyle/>
           <a:p>
             <a:endParaRPr kumimoji="0" lang="en-US"/>
           </a:p>
@@ -2001,9 +2174,7 @@
         <p:spPr/>
         <p:txBody>
           <a:bodyPr/>
-          <a:lstStyle>
-            <a:extLst/>
-          </a:lstStyle>
+          <a:lstStyle/>
           <a:p>
             <a:fld id="{D5BBC35B-A44B-4119-B8DA-DE9E3DFADA20}" type="slidenum">
               <a:rPr kumimoji="0" lang="en-US" smtClean="0"/>
@@ -2349,41 +2520,39 @@
         <p:spPr/>
         <p:txBody>
           <a:bodyPr/>
-          <a:lstStyle>
-            <a:extLst/>
-          </a:lstStyle>
+          <a:lstStyle/>
           <a:p>
             <a:pPr lvl="0" eaLnBrk="1" latinLnBrk="0" hangingPunct="1"/>
             <a:r>
-              <a:rPr lang="sk-SK" smtClean="0"/>
+              <a:rPr lang="sk-SK"/>
               <a:t>Kliknite sem a upravte štýly predlohy textu.</a:t>
             </a:r>
           </a:p>
           <a:p>
             <a:pPr lvl="1" eaLnBrk="1" latinLnBrk="0" hangingPunct="1"/>
             <a:r>
-              <a:rPr lang="sk-SK" smtClean="0"/>
+              <a:rPr lang="sk-SK"/>
               <a:t>Druhá úroveň</a:t>
             </a:r>
           </a:p>
           <a:p>
             <a:pPr lvl="2" eaLnBrk="1" latinLnBrk="0" hangingPunct="1"/>
             <a:r>
-              <a:rPr lang="sk-SK" smtClean="0"/>
+              <a:rPr lang="sk-SK"/>
               <a:t>Tretia úroveň</a:t>
             </a:r>
           </a:p>
           <a:p>
             <a:pPr lvl="3" eaLnBrk="1" latinLnBrk="0" hangingPunct="1"/>
             <a:r>
-              <a:rPr lang="sk-SK" smtClean="0"/>
+              <a:rPr lang="sk-SK"/>
               <a:t>Štvrtá úroveň</a:t>
             </a:r>
           </a:p>
           <a:p>
             <a:pPr lvl="4" eaLnBrk="1" latinLnBrk="0" hangingPunct="1"/>
             <a:r>
-              <a:rPr lang="sk-SK" smtClean="0"/>
+              <a:rPr lang="sk-SK"/>
               <a:t>Piata úroveň</a:t>
             </a:r>
             <a:endParaRPr kumimoji="0" lang="en-US"/>
@@ -2403,9 +2572,7 @@
         <p:spPr/>
         <p:txBody>
           <a:bodyPr/>
-          <a:lstStyle>
-            <a:extLst/>
-          </a:lstStyle>
+          <a:lstStyle/>
           <a:p>
             <a:fld id="{544213AF-26F6-41FA-8D85-E2C5388D6E58}" type="datetimeFigureOut">
               <a:rPr lang="en-US" smtClean="0"/>
@@ -2429,9 +2596,7 @@
         <p:spPr/>
         <p:txBody>
           <a:bodyPr/>
-          <a:lstStyle>
-            <a:extLst/>
-          </a:lstStyle>
+          <a:lstStyle/>
           <a:p>
             <a:endParaRPr kumimoji="0" lang="en-US"/>
           </a:p>
@@ -2450,9 +2615,7 @@
         <p:spPr/>
         <p:txBody>
           <a:bodyPr/>
-          <a:lstStyle>
-            <a:extLst/>
-          </a:lstStyle>
+          <a:lstStyle/>
           <a:p>
             <a:fld id="{D5BBC35B-A44B-4119-B8DA-DE9E3DFADA20}" type="slidenum">
               <a:rPr kumimoji="0" lang="en-US" smtClean="0"/>
@@ -2476,12 +2639,10 @@
         <p:spPr/>
         <p:txBody>
           <a:bodyPr rtlCol="0"/>
-          <a:lstStyle>
-            <a:extLst/>
-          </a:lstStyle>
-          <a:p>
-            <a:r>
-              <a:rPr kumimoji="0" lang="sk-SK" smtClean="0"/>
+          <a:lstStyle/>
+          <a:p>
+            <a:r>
+              <a:rPr kumimoji="0" lang="sk-SK"/>
               <a:t>Kliknite sem a upravte štýl predlohy nadpisov.</a:t>
             </a:r>
             <a:endParaRPr kumimoji="0" lang="en-US"/>
@@ -2558,7 +2719,7 @@
           </a:lstStyle>
           <a:p>
             <a:r>
-              <a:rPr kumimoji="0" lang="sk-SK" smtClean="0"/>
+              <a:rPr kumimoji="0" lang="sk-SK"/>
               <a:t>Kliknite sem a upravte štýl predlohy nadpisov.</a:t>
             </a:r>
             <a:endParaRPr kumimoji="0" lang="en-US"/>
@@ -2637,7 +2798,7 @@
           <a:p>
             <a:pPr lvl="0" eaLnBrk="1" latinLnBrk="0" hangingPunct="1"/>
             <a:r>
-              <a:rPr kumimoji="0" lang="sk-SK" smtClean="0"/>
+              <a:rPr kumimoji="0" lang="sk-SK"/>
               <a:t>Kliknite sem a upravte štýly predlohy textu.</a:t>
             </a:r>
           </a:p>
@@ -2656,9 +2817,7 @@
         <p:spPr/>
         <p:txBody>
           <a:bodyPr/>
-          <a:lstStyle>
-            <a:extLst/>
-          </a:lstStyle>
+          <a:lstStyle/>
           <a:p>
             <a:fld id="{544213AF-26F6-41FA-8D85-E2C5388D6E58}" type="datetimeFigureOut">
               <a:rPr lang="en-US" smtClean="0"/>
@@ -2682,9 +2841,7 @@
         <p:spPr/>
         <p:txBody>
           <a:bodyPr/>
-          <a:lstStyle>
-            <a:extLst/>
-          </a:lstStyle>
+          <a:lstStyle/>
           <a:p>
             <a:endParaRPr kumimoji="0" lang="en-US"/>
           </a:p>
@@ -2703,9 +2860,7 @@
         <p:spPr/>
         <p:txBody>
           <a:bodyPr/>
-          <a:lstStyle>
-            <a:extLst/>
-          </a:lstStyle>
+          <a:lstStyle/>
           <a:p>
             <a:fld id="{D5BBC35B-A44B-4119-B8DA-DE9E3DFADA20}" type="slidenum">
               <a:rPr kumimoji="0" lang="en-US" smtClean="0"/>
@@ -2787,9 +2942,7 @@
         </p:style>
         <p:txBody>
           <a:bodyPr anchor="ctr"/>
-          <a:lstStyle>
-            <a:extLst/>
-          </a:lstStyle>
+          <a:lstStyle/>
           <a:p>
             <a:pPr algn="l" eaLnBrk="1" latinLnBrk="0" hangingPunct="1"/>
             <a:endParaRPr kumimoji="0" lang="en-US"/>
@@ -2867,9 +3020,7 @@
         </p:style>
         <p:txBody>
           <a:bodyPr anchor="ctr"/>
-          <a:lstStyle>
-            <a:extLst/>
-          </a:lstStyle>
+          <a:lstStyle/>
           <a:p>
             <a:pPr algn="l" eaLnBrk="1" latinLnBrk="0" hangingPunct="1"/>
             <a:endParaRPr kumimoji="0" lang="en-US"/>
@@ -2941,35 +3092,35 @@
           <a:p>
             <a:pPr lvl="0" eaLnBrk="1" latinLnBrk="0" hangingPunct="1"/>
             <a:r>
-              <a:rPr lang="sk-SK" smtClean="0"/>
+              <a:rPr lang="sk-SK"/>
               <a:t>Kliknite sem a upravte štýly predlohy textu.</a:t>
             </a:r>
           </a:p>
           <a:p>
             <a:pPr lvl="1" eaLnBrk="1" latinLnBrk="0" hangingPunct="1"/>
             <a:r>
-              <a:rPr lang="sk-SK" smtClean="0"/>
+              <a:rPr lang="sk-SK"/>
               <a:t>Druhá úroveň</a:t>
             </a:r>
           </a:p>
           <a:p>
             <a:pPr lvl="2" eaLnBrk="1" latinLnBrk="0" hangingPunct="1"/>
             <a:r>
-              <a:rPr lang="sk-SK" smtClean="0"/>
+              <a:rPr lang="sk-SK"/>
               <a:t>Tretia úroveň</a:t>
             </a:r>
           </a:p>
           <a:p>
             <a:pPr lvl="3" eaLnBrk="1" latinLnBrk="0" hangingPunct="1"/>
             <a:r>
-              <a:rPr lang="sk-SK" smtClean="0"/>
+              <a:rPr lang="sk-SK"/>
               <a:t>Štvrtá úroveň</a:t>
             </a:r>
           </a:p>
           <a:p>
             <a:pPr lvl="4" eaLnBrk="1" latinLnBrk="0" hangingPunct="1"/>
             <a:r>
-              <a:rPr lang="sk-SK" smtClean="0"/>
+              <a:rPr lang="sk-SK"/>
               <a:t>Piata úroveň</a:t>
             </a:r>
             <a:endParaRPr kumimoji="0" lang="en-US"/>
@@ -3015,35 +3166,35 @@
           <a:p>
             <a:pPr lvl="0" eaLnBrk="1" latinLnBrk="0" hangingPunct="1"/>
             <a:r>
-              <a:rPr lang="sk-SK" smtClean="0"/>
+              <a:rPr lang="sk-SK"/>
               <a:t>Kliknite sem a upravte štýly predlohy textu.</a:t>
             </a:r>
           </a:p>
           <a:p>
             <a:pPr lvl="1" eaLnBrk="1" latinLnBrk="0" hangingPunct="1"/>
             <a:r>
-              <a:rPr lang="sk-SK" smtClean="0"/>
+              <a:rPr lang="sk-SK"/>
               <a:t>Druhá úroveň</a:t>
             </a:r>
           </a:p>
           <a:p>
             <a:pPr lvl="2" eaLnBrk="1" latinLnBrk="0" hangingPunct="1"/>
             <a:r>
-              <a:rPr lang="sk-SK" smtClean="0"/>
+              <a:rPr lang="sk-SK"/>
               <a:t>Tretia úroveň</a:t>
             </a:r>
           </a:p>
           <a:p>
             <a:pPr lvl="3" eaLnBrk="1" latinLnBrk="0" hangingPunct="1"/>
             <a:r>
-              <a:rPr lang="sk-SK" smtClean="0"/>
+              <a:rPr lang="sk-SK"/>
               <a:t>Štvrtá úroveň</a:t>
             </a:r>
           </a:p>
           <a:p>
             <a:pPr lvl="4" eaLnBrk="1" latinLnBrk="0" hangingPunct="1"/>
             <a:r>
-              <a:rPr lang="sk-SK" smtClean="0"/>
+              <a:rPr lang="sk-SK"/>
               <a:t>Piata úroveň</a:t>
             </a:r>
             <a:endParaRPr kumimoji="0" lang="en-US"/>
@@ -3063,9 +3214,7 @@
         <p:spPr/>
         <p:txBody>
           <a:bodyPr/>
-          <a:lstStyle>
-            <a:extLst/>
-          </a:lstStyle>
+          <a:lstStyle/>
           <a:p>
             <a:fld id="{544213AF-26F6-41FA-8D85-E2C5388D6E58}" type="datetimeFigureOut">
               <a:rPr lang="en-US" smtClean="0"/>
@@ -3089,9 +3238,7 @@
         <p:spPr/>
         <p:txBody>
           <a:bodyPr/>
-          <a:lstStyle>
-            <a:extLst/>
-          </a:lstStyle>
+          <a:lstStyle/>
           <a:p>
             <a:endParaRPr kumimoji="0" lang="en-US"/>
           </a:p>
@@ -3110,9 +3257,7 @@
         <p:spPr/>
         <p:txBody>
           <a:bodyPr/>
-          <a:lstStyle>
-            <a:extLst/>
-          </a:lstStyle>
+          <a:lstStyle/>
           <a:p>
             <a:fld id="{D5BBC35B-A44B-4119-B8DA-DE9E3DFADA20}" type="slidenum">
               <a:rPr kumimoji="0" lang="en-US" smtClean="0"/>
@@ -3136,12 +3281,10 @@
         <p:spPr/>
         <p:txBody>
           <a:bodyPr rtlCol="0"/>
-          <a:lstStyle>
-            <a:extLst/>
-          </a:lstStyle>
-          <a:p>
-            <a:r>
-              <a:rPr kumimoji="0" lang="sk-SK" smtClean="0"/>
+          <a:lstStyle/>
+          <a:p>
+            <a:r>
+              <a:rPr kumimoji="0" lang="sk-SK"/>
               <a:t>Kliknite sem a upravte štýl predlohy nadpisov.</a:t>
             </a:r>
             <a:endParaRPr kumimoji="0" lang="en-US"/>
@@ -3200,7 +3343,7 @@
           </a:lstStyle>
           <a:p>
             <a:r>
-              <a:rPr kumimoji="0" lang="sk-SK" smtClean="0"/>
+              <a:rPr kumimoji="0" lang="sk-SK"/>
               <a:t>Kliknite sem a upravte štýl predlohy nadpisov.</a:t>
             </a:r>
             <a:endParaRPr kumimoji="0" lang="en-US"/>
@@ -3264,7 +3407,7 @@
           <a:p>
             <a:pPr lvl="0" eaLnBrk="1" latinLnBrk="0" hangingPunct="1"/>
             <a:r>
-              <a:rPr kumimoji="0" lang="sk-SK" smtClean="0"/>
+              <a:rPr kumimoji="0" lang="sk-SK"/>
               <a:t>Kliknite sem a upravte štýly predlohy textu.</a:t>
             </a:r>
           </a:p>
@@ -3327,7 +3470,7 @@
           <a:p>
             <a:pPr lvl="0" eaLnBrk="1" latinLnBrk="0" hangingPunct="1"/>
             <a:r>
-              <a:rPr kumimoji="0" lang="sk-SK" smtClean="0"/>
+              <a:rPr kumimoji="0" lang="sk-SK"/>
               <a:t>Kliknite sem a upravte štýly predlohy textu.</a:t>
             </a:r>
           </a:p>
@@ -3377,35 +3520,35 @@
           <a:p>
             <a:pPr lvl="0" eaLnBrk="1" latinLnBrk="0" hangingPunct="1"/>
             <a:r>
-              <a:rPr lang="sk-SK" smtClean="0"/>
+              <a:rPr lang="sk-SK"/>
               <a:t>Kliknite sem a upravte štýly predlohy textu.</a:t>
             </a:r>
           </a:p>
           <a:p>
             <a:pPr lvl="1" eaLnBrk="1" latinLnBrk="0" hangingPunct="1"/>
             <a:r>
-              <a:rPr lang="sk-SK" smtClean="0"/>
+              <a:rPr lang="sk-SK"/>
               <a:t>Druhá úroveň</a:t>
             </a:r>
           </a:p>
           <a:p>
             <a:pPr lvl="2" eaLnBrk="1" latinLnBrk="0" hangingPunct="1"/>
             <a:r>
-              <a:rPr lang="sk-SK" smtClean="0"/>
+              <a:rPr lang="sk-SK"/>
               <a:t>Tretia úroveň</a:t>
             </a:r>
           </a:p>
           <a:p>
             <a:pPr lvl="3" eaLnBrk="1" latinLnBrk="0" hangingPunct="1"/>
             <a:r>
-              <a:rPr lang="sk-SK" smtClean="0"/>
+              <a:rPr lang="sk-SK"/>
               <a:t>Štvrtá úroveň</a:t>
             </a:r>
           </a:p>
           <a:p>
             <a:pPr lvl="4" eaLnBrk="1" latinLnBrk="0" hangingPunct="1"/>
             <a:r>
-              <a:rPr lang="sk-SK" smtClean="0"/>
+              <a:rPr lang="sk-SK"/>
               <a:t>Piata úroveň</a:t>
             </a:r>
             <a:endParaRPr kumimoji="0" lang="en-US"/>
@@ -3459,35 +3602,35 @@
           <a:p>
             <a:pPr lvl="0" eaLnBrk="1" latinLnBrk="0" hangingPunct="1"/>
             <a:r>
-              <a:rPr lang="sk-SK" smtClean="0"/>
+              <a:rPr lang="sk-SK"/>
               <a:t>Kliknite sem a upravte štýly predlohy textu.</a:t>
             </a:r>
           </a:p>
           <a:p>
             <a:pPr lvl="1" eaLnBrk="1" latinLnBrk="0" hangingPunct="1"/>
             <a:r>
-              <a:rPr lang="sk-SK" smtClean="0"/>
+              <a:rPr lang="sk-SK"/>
               <a:t>Druhá úroveň</a:t>
             </a:r>
           </a:p>
           <a:p>
             <a:pPr lvl="2" eaLnBrk="1" latinLnBrk="0" hangingPunct="1"/>
             <a:r>
-              <a:rPr lang="sk-SK" smtClean="0"/>
+              <a:rPr lang="sk-SK"/>
               <a:t>Tretia úroveň</a:t>
             </a:r>
           </a:p>
           <a:p>
             <a:pPr lvl="3" eaLnBrk="1" latinLnBrk="0" hangingPunct="1"/>
             <a:r>
-              <a:rPr lang="sk-SK" smtClean="0"/>
+              <a:rPr lang="sk-SK"/>
               <a:t>Štvrtá úroveň</a:t>
             </a:r>
           </a:p>
           <a:p>
             <a:pPr lvl="4" eaLnBrk="1" latinLnBrk="0" hangingPunct="1"/>
             <a:r>
-              <a:rPr lang="sk-SK" smtClean="0"/>
+              <a:rPr lang="sk-SK"/>
               <a:t>Piata úroveň</a:t>
             </a:r>
             <a:endParaRPr kumimoji="0" lang="en-US"/>
@@ -3507,9 +3650,7 @@
         <p:spPr/>
         <p:txBody>
           <a:bodyPr/>
-          <a:lstStyle>
-            <a:extLst/>
-          </a:lstStyle>
+          <a:lstStyle/>
           <a:p>
             <a:fld id="{544213AF-26F6-41FA-8D85-E2C5388D6E58}" type="datetimeFigureOut">
               <a:rPr lang="en-US" smtClean="0"/>
@@ -3533,9 +3674,7 @@
         <p:spPr/>
         <p:txBody>
           <a:bodyPr/>
-          <a:lstStyle>
-            <a:extLst/>
-          </a:lstStyle>
+          <a:lstStyle/>
           <a:p>
             <a:endParaRPr kumimoji="0" lang="en-US"/>
           </a:p>
@@ -3554,9 +3693,7 @@
         <p:spPr/>
         <p:txBody>
           <a:bodyPr/>
-          <a:lstStyle>
-            <a:extLst/>
-          </a:lstStyle>
+          <a:lstStyle/>
           <a:p>
             <a:fld id="{D5BBC35B-A44B-4119-B8DA-DE9E3DFADA20}" type="slidenum">
               <a:rPr kumimoji="0" lang="en-US" smtClean="0"/>
@@ -3606,9 +3743,7 @@
         <p:spPr/>
         <p:txBody>
           <a:bodyPr/>
-          <a:lstStyle>
-            <a:extLst/>
-          </a:lstStyle>
+          <a:lstStyle/>
           <a:p>
             <a:fld id="{544213AF-26F6-41FA-8D85-E2C5388D6E58}" type="datetimeFigureOut">
               <a:rPr lang="en-US" smtClean="0"/>
@@ -3632,9 +3767,7 @@
         <p:spPr/>
         <p:txBody>
           <a:bodyPr/>
-          <a:lstStyle>
-            <a:extLst/>
-          </a:lstStyle>
+          <a:lstStyle/>
           <a:p>
             <a:endParaRPr kumimoji="0" lang="en-US"/>
           </a:p>
@@ -3653,9 +3786,7 @@
         <p:spPr/>
         <p:txBody>
           <a:bodyPr/>
-          <a:lstStyle>
-            <a:extLst/>
-          </a:lstStyle>
+          <a:lstStyle/>
           <a:p>
             <a:fld id="{D5BBC35B-A44B-4119-B8DA-DE9E3DFADA20}" type="slidenum">
               <a:rPr kumimoji="0" lang="en-US" smtClean="0"/>
@@ -3679,12 +3810,10 @@
         <p:spPr/>
         <p:txBody>
           <a:bodyPr rtlCol="0"/>
-          <a:lstStyle>
-            <a:extLst/>
-          </a:lstStyle>
-          <a:p>
-            <a:r>
-              <a:rPr kumimoji="0" lang="sk-SK" smtClean="0"/>
+          <a:lstStyle/>
+          <a:p>
+            <a:r>
+              <a:rPr kumimoji="0" lang="sk-SK"/>
               <a:t>Kliknite sem a upravte štýl predlohy nadpisov.</a:t>
             </a:r>
             <a:endParaRPr kumimoji="0" lang="en-US"/>
@@ -3730,9 +3859,7 @@
         <p:spPr/>
         <p:txBody>
           <a:bodyPr/>
-          <a:lstStyle>
-            <a:extLst/>
-          </a:lstStyle>
+          <a:lstStyle/>
           <a:p>
             <a:fld id="{544213AF-26F6-41FA-8D85-E2C5388D6E58}" type="datetimeFigureOut">
               <a:rPr lang="en-US" smtClean="0"/>
@@ -3756,9 +3883,7 @@
         <p:spPr/>
         <p:txBody>
           <a:bodyPr/>
-          <a:lstStyle>
-            <a:extLst/>
-          </a:lstStyle>
+          <a:lstStyle/>
           <a:p>
             <a:endParaRPr kumimoji="0" lang="en-US"/>
           </a:p>
@@ -3777,9 +3902,7 @@
         <p:spPr/>
         <p:txBody>
           <a:bodyPr/>
-          <a:lstStyle>
-            <a:extLst/>
-          </a:lstStyle>
+          <a:lstStyle/>
           <a:p>
             <a:fld id="{D5BBC35B-A44B-4119-B8DA-DE9E3DFADA20}" type="slidenum">
               <a:rPr kumimoji="0" lang="en-US" smtClean="0"/>
@@ -3853,7 +3976,7 @@
           </a:lstStyle>
           <a:p>
             <a:r>
-              <a:rPr kumimoji="0" lang="sk-SK" smtClean="0"/>
+              <a:rPr kumimoji="0" lang="sk-SK"/>
               <a:t>Kliknite sem a upravte štýl predlohy nadpisov.</a:t>
             </a:r>
             <a:endParaRPr kumimoji="0" lang="en-US"/>
@@ -3904,7 +4027,7 @@
           <a:p>
             <a:pPr lvl="0" eaLnBrk="1" latinLnBrk="0" hangingPunct="1"/>
             <a:r>
-              <a:rPr kumimoji="0" lang="sk-SK" smtClean="0"/>
+              <a:rPr kumimoji="0" lang="sk-SK"/>
               <a:t>Kliknite sem a upravte štýly predlohy textu.</a:t>
             </a:r>
           </a:p>
@@ -3949,35 +4072,35 @@
           <a:p>
             <a:pPr lvl="0" eaLnBrk="1" latinLnBrk="0" hangingPunct="1"/>
             <a:r>
-              <a:rPr lang="sk-SK" smtClean="0"/>
+              <a:rPr lang="sk-SK"/>
               <a:t>Kliknite sem a upravte štýly predlohy textu.</a:t>
             </a:r>
           </a:p>
           <a:p>
             <a:pPr lvl="1" eaLnBrk="1" latinLnBrk="0" hangingPunct="1"/>
             <a:r>
-              <a:rPr lang="sk-SK" smtClean="0"/>
+              <a:rPr lang="sk-SK"/>
               <a:t>Druhá úroveň</a:t>
             </a:r>
           </a:p>
           <a:p>
             <a:pPr lvl="2" eaLnBrk="1" latinLnBrk="0" hangingPunct="1"/>
             <a:r>
-              <a:rPr lang="sk-SK" smtClean="0"/>
+              <a:rPr lang="sk-SK"/>
               <a:t>Tretia úroveň</a:t>
             </a:r>
           </a:p>
           <a:p>
             <a:pPr lvl="3" eaLnBrk="1" latinLnBrk="0" hangingPunct="1"/>
             <a:r>
-              <a:rPr lang="sk-SK" smtClean="0"/>
+              <a:rPr lang="sk-SK"/>
               <a:t>Štvrtá úroveň</a:t>
             </a:r>
           </a:p>
           <a:p>
             <a:pPr lvl="4" eaLnBrk="1" latinLnBrk="0" hangingPunct="1"/>
             <a:r>
-              <a:rPr lang="sk-SK" smtClean="0"/>
+              <a:rPr lang="sk-SK"/>
               <a:t>Piata úroveň</a:t>
             </a:r>
             <a:endParaRPr kumimoji="0" lang="en-US"/>
@@ -4002,9 +4125,7 @@
         </p:spPr>
         <p:txBody>
           <a:bodyPr/>
-          <a:lstStyle>
-            <a:extLst/>
-          </a:lstStyle>
+          <a:lstStyle/>
           <a:p>
             <a:fld id="{544213AF-26F6-41FA-8D85-E2C5388D6E58}" type="datetimeFigureOut">
               <a:rPr lang="en-US" smtClean="0"/>
@@ -4028,9 +4149,7 @@
         <p:spPr/>
         <p:txBody>
           <a:bodyPr/>
-          <a:lstStyle>
-            <a:extLst/>
-          </a:lstStyle>
+          <a:lstStyle/>
           <a:p>
             <a:endParaRPr kumimoji="0" lang="en-US"/>
           </a:p>
@@ -4049,9 +4168,7 @@
         <p:spPr/>
         <p:txBody>
           <a:bodyPr/>
-          <a:lstStyle>
-            <a:extLst/>
-          </a:lstStyle>
+          <a:lstStyle/>
           <a:p>
             <a:fld id="{D5BBC35B-A44B-4119-B8DA-DE9E3DFADA20}" type="slidenum">
               <a:rPr kumimoji="0" lang="en-US" smtClean="0"/>
@@ -4129,7 +4246,7 @@
           <a:p>
             <a:pPr lvl="0" eaLnBrk="1" latinLnBrk="0" hangingPunct="1"/>
             <a:r>
-              <a:rPr kumimoji="0" lang="sk-SK" smtClean="0"/>
+              <a:rPr kumimoji="0" lang="sk-SK"/>
               <a:t>Kliknite sem a upravte štýly predlohy textu.</a:t>
             </a:r>
           </a:p>
@@ -4178,7 +4295,7 @@
           </a:lstStyle>
           <a:p>
             <a:r>
-              <a:rPr kumimoji="0" lang="sk-SK" smtClean="0"/>
+              <a:rPr kumimoji="0" lang="sk-SK"/>
               <a:t>Ak chcete pridať obrázok, kliknite na ikonu</a:t>
             </a:r>
             <a:endParaRPr kumimoji="0" lang="en-US" dirty="0"/>
@@ -4337,7 +4454,7 @@
           </a:lstStyle>
           <a:p>
             <a:r>
-              <a:rPr kumimoji="0" lang="sk-SK" smtClean="0"/>
+              <a:rPr kumimoji="0" lang="sk-SK"/>
               <a:t>Kliknite sem a upravte štýl predlohy nadpisov.</a:t>
             </a:r>
             <a:endParaRPr kumimoji="0" lang="en-US"/>
@@ -4420,9 +4537,7 @@
         </p:spPr>
         <p:txBody>
           <a:bodyPr vert="horz" wrap="square" lIns="91440" tIns="45720" rIns="91440" bIns="45720" anchor="t" compatLnSpc="1"/>
-          <a:lstStyle>
-            <a:extLst/>
-          </a:lstStyle>
+          <a:lstStyle/>
           <a:p>
             <a:endParaRPr kumimoji="0" lang="en-US"/>
           </a:p>
@@ -4502,9 +4617,7 @@
         </p:spPr>
         <p:txBody>
           <a:bodyPr vert="horz" wrap="square" lIns="91440" tIns="45720" rIns="91440" bIns="45720" anchor="t" compatLnSpc="1"/>
-          <a:lstStyle>
-            <a:extLst/>
-          </a:lstStyle>
+          <a:lstStyle/>
           <a:p>
             <a:endParaRPr kumimoji="0" lang="en-US"/>
           </a:p>
@@ -4612,9 +4725,7 @@
         </p:style>
         <p:txBody>
           <a:bodyPr vert="horz" wrap="square" lIns="91440" tIns="45720" rIns="91440" bIns="45720" anchor="ctr" compatLnSpc="1"/>
-          <a:lstStyle>
-            <a:extLst/>
-          </a:lstStyle>
+          <a:lstStyle/>
           <a:p>
             <a:pPr algn="ctr" eaLnBrk="1" latinLnBrk="0" hangingPunct="1"/>
             <a:endParaRPr kumimoji="0" lang="en-US"/>
@@ -4745,9 +4856,7 @@
         </p:style>
         <p:txBody>
           <a:bodyPr anchor="ctr"/>
-          <a:lstStyle>
-            <a:extLst/>
-          </a:lstStyle>
+          <a:lstStyle/>
           <a:p>
             <a:pPr algn="l" eaLnBrk="1" latinLnBrk="0" hangingPunct="1"/>
             <a:endParaRPr kumimoji="0" lang="en-US"/>
@@ -4825,9 +4934,7 @@
         </p:style>
         <p:txBody>
           <a:bodyPr anchor="ctr"/>
-          <a:lstStyle>
-            <a:extLst/>
-          </a:lstStyle>
+          <a:lstStyle/>
           <a:p>
             <a:pPr algn="l" eaLnBrk="1" latinLnBrk="0" hangingPunct="1"/>
             <a:endParaRPr kumimoji="0" lang="en-US"/>
@@ -4944,9 +5051,7 @@
         </p:spPr>
         <p:txBody>
           <a:bodyPr vert="horz" wrap="square" lIns="91440" tIns="45720" rIns="91440" bIns="45720" anchor="t" compatLnSpc="1"/>
-          <a:lstStyle>
-            <a:extLst/>
-          </a:lstStyle>
+          <a:lstStyle/>
           <a:p>
             <a:endParaRPr kumimoji="0" lang="en-US"/>
           </a:p>
@@ -5026,9 +5131,7 @@
         </p:spPr>
         <p:txBody>
           <a:bodyPr vert="horz" wrap="square" lIns="91440" tIns="45720" rIns="91440" bIns="45720" anchor="t" compatLnSpc="1"/>
-          <a:lstStyle>
-            <a:extLst/>
-          </a:lstStyle>
+          <a:lstStyle/>
           <a:p>
             <a:endParaRPr kumimoji="0" lang="en-US"/>
           </a:p>
@@ -5136,9 +5239,7 @@
         </p:style>
         <p:txBody>
           <a:bodyPr vert="horz" wrap="square" lIns="91440" tIns="45720" rIns="91440" bIns="45720" anchor="ctr" compatLnSpc="1"/>
-          <a:lstStyle>
-            <a:extLst/>
-          </a:lstStyle>
+          <a:lstStyle/>
           <a:p>
             <a:pPr algn="ctr" eaLnBrk="1" latinLnBrk="0" hangingPunct="1"/>
             <a:endParaRPr kumimoji="0" lang="en-US"/>
@@ -5228,12 +5329,10 @@
               <a:bevelT w="25400" h="25400"/>
             </a:sp3d>
           </a:bodyPr>
-          <a:lstStyle>
-            <a:extLst/>
-          </a:lstStyle>
-          <a:p>
-            <a:r>
-              <a:rPr kumimoji="0" lang="sk-SK" smtClean="0"/>
+          <a:lstStyle/>
+          <a:p>
+            <a:r>
+              <a:rPr kumimoji="0" lang="sk-SK"/>
               <a:t>Kliknite sem a upravte štýl predlohy nadpisov.</a:t>
             </a:r>
             <a:endParaRPr kumimoji="0" lang="en-US"/>
@@ -5263,41 +5362,39 @@
           <a:bodyPr vert="horz">
             <a:normAutofit/>
           </a:bodyPr>
-          <a:lstStyle>
-            <a:extLst/>
-          </a:lstStyle>
+          <a:lstStyle/>
           <a:p>
             <a:pPr lvl="0" eaLnBrk="1" latinLnBrk="0" hangingPunct="1"/>
             <a:r>
-              <a:rPr kumimoji="0" lang="sk-SK" smtClean="0"/>
+              <a:rPr kumimoji="0" lang="sk-SK"/>
               <a:t>Kliknite sem a upravte štýly predlohy textu.</a:t>
             </a:r>
           </a:p>
           <a:p>
             <a:pPr lvl="1" eaLnBrk="1" latinLnBrk="0" hangingPunct="1"/>
             <a:r>
-              <a:rPr kumimoji="0" lang="sk-SK" smtClean="0"/>
+              <a:rPr kumimoji="0" lang="sk-SK"/>
               <a:t>Druhá úroveň</a:t>
             </a:r>
           </a:p>
           <a:p>
             <a:pPr lvl="2" eaLnBrk="1" latinLnBrk="0" hangingPunct="1"/>
             <a:r>
-              <a:rPr kumimoji="0" lang="sk-SK" smtClean="0"/>
+              <a:rPr kumimoji="0" lang="sk-SK"/>
               <a:t>Tretia úroveň</a:t>
             </a:r>
           </a:p>
           <a:p>
             <a:pPr lvl="3" eaLnBrk="1" latinLnBrk="0" hangingPunct="1"/>
             <a:r>
-              <a:rPr kumimoji="0" lang="sk-SK" smtClean="0"/>
+              <a:rPr kumimoji="0" lang="sk-SK"/>
               <a:t>Štvrtá úroveň</a:t>
             </a:r>
           </a:p>
           <a:p>
             <a:pPr lvl="4" eaLnBrk="1" latinLnBrk="0" hangingPunct="1"/>
             <a:r>
-              <a:rPr kumimoji="0" lang="sk-SK" smtClean="0"/>
+              <a:rPr kumimoji="0" lang="sk-SK"/>
               <a:t>Piata úroveň</a:t>
             </a:r>
             <a:endParaRPr kumimoji="0" lang="en-US"/>
@@ -5789,38 +5886,30 @@
           <a:p>
             <a:pPr algn="ctr"/>
             <a:r>
-              <a:rPr lang="en-US" sz="2800" dirty="0" smtClean="0"/>
-              <a:t>Automated </a:t>
-            </a:r>
-            <a:r>
-              <a:rPr lang="en-US" sz="2800" dirty="0" smtClean="0"/>
-              <a:t>detection and </a:t>
-            </a:r>
-            <a:r>
-              <a:rPr lang="en-US" sz="2800" dirty="0" err="1" smtClean="0"/>
+              <a:rPr lang="en-US" sz="2800" dirty="0"/>
+              <a:t>Automated detection and </a:t>
+            </a:r>
+            <a:r>
+              <a:rPr lang="en-US" sz="2800" dirty="0" err="1"/>
               <a:t>classi</a:t>
             </a:r>
             <a:r>
-              <a:rPr lang="sk-SK" sz="2800" dirty="0" err="1" smtClean="0"/>
+              <a:rPr lang="sk-SK" sz="2800" dirty="0" err="1"/>
               <a:t>fi</a:t>
             </a:r>
             <a:r>
-              <a:rPr lang="en-US" sz="2800" dirty="0" err="1" smtClean="0"/>
+              <a:rPr lang="en-US" sz="2800" dirty="0" err="1"/>
               <a:t>cation</a:t>
             </a:r>
             <a:r>
-              <a:rPr lang="en-US" sz="2800" dirty="0" smtClean="0"/>
-              <a:t> </a:t>
-            </a:r>
-            <a:r>
-              <a:rPr lang="en-US" sz="2800" dirty="0" smtClean="0"/>
-              <a:t>of</a:t>
+              <a:rPr lang="en-US" sz="2800" dirty="0"/>
+              <a:t> of</a:t>
             </a:r>
             <a:br>
-              <a:rPr lang="en-US" sz="2800" dirty="0" smtClean="0"/>
+              <a:rPr lang="en-US" sz="2800" dirty="0"/>
             </a:br>
             <a:r>
-              <a:rPr lang="en-US" sz="2800" dirty="0" smtClean="0"/>
+              <a:rPr lang="en-US" sz="2800" dirty="0"/>
               <a:t>events in the time series of hydraulic sensors</a:t>
             </a:r>
             <a:endParaRPr sz="2800" dirty="0"/>
@@ -5862,23 +5951,23 @@
               <a:buNone/>
             </a:pPr>
             <a:r>
-              <a:rPr lang="sk-SK" sz="2000" dirty="0" smtClean="0"/>
+              <a:rPr lang="sk-SK" sz="2000" dirty="0"/>
               <a:t>Alexander </a:t>
             </a:r>
             <a:r>
-              <a:rPr lang="sk-SK" sz="2000" dirty="0" err="1" smtClean="0"/>
+              <a:rPr lang="sk-SK" sz="2000" dirty="0" err="1"/>
               <a:t>Mačejovský</a:t>
             </a:r>
             <a:r>
-              <a:rPr lang="sk-SK" sz="2000" dirty="0" smtClean="0"/>
+              <a:rPr lang="sk-SK" sz="2000" dirty="0"/>
               <a:t>, </a:t>
             </a:r>
             <a:r>
-              <a:rPr lang="sk-SK" sz="2000" dirty="0" err="1" smtClean="0"/>
+              <a:rPr lang="sk-SK" sz="2000" dirty="0" err="1"/>
               <a:t>Štěpán</a:t>
             </a:r>
             <a:r>
-              <a:rPr lang="sk-SK" sz="2000" dirty="0" smtClean="0"/>
+              <a:rPr lang="sk-SK" sz="2000" dirty="0"/>
               <a:t> Pardubický</a:t>
             </a:r>
             <a:endParaRPr sz="2000" dirty="0"/>
@@ -5890,13 +5979,6 @@
   <p:clrMapOvr>
     <a:masterClrMapping/>
   </p:clrMapOvr>
-  <p:timing>
-    <p:tnLst>
-      <p:par>
-        <p:cTn id="1" dur="indefinite" restart="never" nodeType="tmRoot"/>
-      </p:par>
-    </p:tnLst>
-  </p:timing>
 </p:sld>
 </file>
 
@@ -5938,14 +6020,9 @@
           <a:lstStyle/>
           <a:p>
             <a:r>
-              <a:rPr lang="en-GB" dirty="0" smtClean="0"/>
-              <a:t>Identified by large moving standard deviation</a:t>
-            </a:r>
-            <a:r>
-              <a:rPr lang="en-GB" dirty="0" smtClean="0"/>
-              <a:t> of the first differences</a:t>
-            </a:r>
-            <a:endParaRPr lang="en-GB" dirty="0"/>
+              <a:rPr lang="en-GB" dirty="0"/>
+              <a:t>Identified by large moving standard deviation of the first differences</a:t>
+            </a:r>
           </a:p>
         </p:txBody>
       </p:sp>
@@ -5965,15 +6042,15 @@
           <a:lstStyle/>
           <a:p>
             <a:r>
-              <a:rPr lang="sk-SK" dirty="0" err="1" smtClean="0"/>
+              <a:rPr lang="sk-SK" dirty="0" err="1"/>
               <a:t>Heightened</a:t>
             </a:r>
             <a:r>
-              <a:rPr lang="sk-SK" dirty="0" smtClean="0"/>
+              <a:rPr lang="sk-SK" dirty="0"/>
               <a:t> </a:t>
             </a:r>
             <a:r>
-              <a:rPr lang="sk-SK" dirty="0" err="1" smtClean="0"/>
+              <a:rPr lang="sk-SK" dirty="0" err="1"/>
               <a:t>volatility</a:t>
             </a:r>
             <a:endParaRPr lang="en-GB" dirty="0"/>
@@ -6033,13 +6110,6 @@
   <p:clrMapOvr>
     <a:masterClrMapping/>
   </p:clrMapOvr>
-  <p:timing>
-    <p:tnLst>
-      <p:par>
-        <p:cTn id="1" dur="indefinite" restart="never" nodeType="tmRoot"/>
-      </p:par>
-    </p:tnLst>
-  </p:timing>
 </p:sld>
 </file>
 
@@ -6081,37 +6151,36 @@
           <a:lstStyle/>
           <a:p>
             <a:r>
-              <a:rPr lang="en-GB" dirty="0" smtClean="0"/>
+              <a:rPr lang="en-GB" dirty="0"/>
               <a:t>Depend on the length of sensor’s malfunction:</a:t>
             </a:r>
           </a:p>
           <a:p>
-            <a:endParaRPr lang="en-GB" dirty="0" smtClean="0"/>
-          </a:p>
-          <a:p>
-            <a:r>
-              <a:rPr lang="en-GB" dirty="0" smtClean="0"/>
+            <a:endParaRPr lang="en-GB" dirty="0"/>
+          </a:p>
+          <a:p>
+            <a:r>
+              <a:rPr lang="en-GB" dirty="0"/>
               <a:t>Short-term errors (&lt;8 periods)</a:t>
             </a:r>
           </a:p>
           <a:p>
-            <a:endParaRPr lang="en-GB" dirty="0" smtClean="0"/>
-          </a:p>
-          <a:p>
-            <a:r>
-              <a:rPr lang="en-GB" dirty="0" smtClean="0"/>
+            <a:endParaRPr lang="en-GB" dirty="0"/>
+          </a:p>
+          <a:p>
+            <a:r>
+              <a:rPr lang="en-GB" dirty="0"/>
               <a:t>Medium-term errors (8-60 periods)</a:t>
             </a:r>
           </a:p>
           <a:p>
-            <a:endParaRPr lang="en-GB" dirty="0" smtClean="0"/>
-          </a:p>
-          <a:p>
-            <a:r>
-              <a:rPr lang="en-GB" dirty="0" smtClean="0"/>
+            <a:endParaRPr lang="en-GB" dirty="0"/>
+          </a:p>
+          <a:p>
+            <a:r>
+              <a:rPr lang="en-GB" dirty="0"/>
               <a:t>Long-term errors (&gt;60 periods)</a:t>
             </a:r>
-            <a:endParaRPr lang="en-GB" dirty="0"/>
           </a:p>
         </p:txBody>
       </p:sp>
@@ -6131,7 +6200,7 @@
           <a:lstStyle/>
           <a:p>
             <a:r>
-              <a:rPr lang="sk-SK" dirty="0" err="1" smtClean="0"/>
+              <a:rPr lang="sk-SK" dirty="0" err="1"/>
               <a:t>Corrections</a:t>
             </a:r>
             <a:endParaRPr lang="en-GB" dirty="0"/>
@@ -6143,13 +6212,6 @@
   <p:clrMapOvr>
     <a:masterClrMapping/>
   </p:clrMapOvr>
-  <p:timing>
-    <p:tnLst>
-      <p:par>
-        <p:cTn id="1" dur="indefinite" restart="never" nodeType="tmRoot"/>
-      </p:par>
-    </p:tnLst>
-  </p:timing>
 </p:sld>
 </file>
 
@@ -6186,32 +6248,12 @@
           <a:lstStyle/>
           <a:p>
             <a:r>
-              <a:rPr lang="sk-SK" dirty="0" err="1" smtClean="0"/>
-              <a:t>Simple</a:t>
-            </a:r>
-            <a:r>
-              <a:rPr lang="sk-SK" dirty="0" smtClean="0"/>
-              <a:t> </a:t>
-            </a:r>
-            <a:r>
-              <a:rPr lang="sk-SK" dirty="0" err="1" smtClean="0"/>
-              <a:t>smoothing</a:t>
-            </a:r>
-            <a:r>
-              <a:rPr lang="sk-SK" dirty="0" smtClean="0"/>
-              <a:t>, </a:t>
-            </a:r>
-            <a:r>
-              <a:rPr lang="sk-SK" dirty="0" err="1" smtClean="0"/>
-              <a:t>practically</a:t>
-            </a:r>
-            <a:r>
-              <a:rPr lang="sk-SK" dirty="0" smtClean="0"/>
-              <a:t> </a:t>
-            </a:r>
-            <a:r>
-              <a:rPr lang="sk-SK" dirty="0" err="1" smtClean="0"/>
-              <a:t>enough</a:t>
+              <a:rPr lang="sk-SK" dirty="0"/>
+              <a:t>Simple smoothing, </a:t>
+            </a:r>
+            <a:r>
+              <a:rPr lang="en-US" dirty="0"/>
+              <a:t>sufficient in practice</a:t>
             </a:r>
             <a:endParaRPr lang="en-GB" dirty="0"/>
           </a:p>
@@ -6233,56 +6275,18 @@
           <a:lstStyle/>
           <a:p>
             <a:r>
-              <a:rPr lang="sk-SK" dirty="0" err="1" smtClean="0"/>
+              <a:rPr lang="sk-SK" dirty="0" err="1"/>
               <a:t>Short-term</a:t>
             </a:r>
             <a:r>
-              <a:rPr lang="sk-SK" dirty="0" smtClean="0"/>
+              <a:rPr lang="sk-SK" dirty="0"/>
               <a:t> </a:t>
             </a:r>
             <a:r>
-              <a:rPr lang="sk-SK" dirty="0" err="1" smtClean="0"/>
+              <a:rPr lang="sk-SK" dirty="0" err="1"/>
               <a:t>corrections</a:t>
             </a:r>
             <a:endParaRPr lang="en-GB" dirty="0"/>
-          </a:p>
-        </p:txBody>
-      </p:sp>
-      <p:sp>
-        <p:nvSpPr>
-          <p:cNvPr id="4" name="BlokTextu 3"/>
-          <p:cNvSpPr txBox="1"/>
-          <p:nvPr/>
-        </p:nvSpPr>
-        <p:spPr>
-          <a:xfrm>
-            <a:off x="7956376" y="4371950"/>
-            <a:ext cx="1008112" cy="307777"/>
-          </a:xfrm>
-          <a:prstGeom prst="rect">
-            <a:avLst/>
-          </a:prstGeom>
-          <a:noFill/>
-        </p:spPr>
-        <p:txBody>
-          <a:bodyPr wrap="square" rtlCol="0">
-            <a:spAutoFit/>
-          </a:bodyPr>
-          <a:lstStyle/>
-          <a:p>
-            <a:r>
-              <a:rPr lang="sk-SK" dirty="0" err="1" smtClean="0">
-                <a:solidFill>
-                  <a:srgbClr val="FF0000"/>
-                </a:solidFill>
-              </a:rPr>
-              <a:t>Stepan</a:t>
-            </a:r>
-            <a:endParaRPr lang="en-GB" dirty="0">
-              <a:solidFill>
-                <a:srgbClr val="FF0000"/>
-              </a:solidFill>
-            </a:endParaRPr>
           </a:p>
         </p:txBody>
       </p:sp>
@@ -6302,7 +6306,7 @@
         </p:blipFill>
         <p:spPr>
           <a:xfrm>
-            <a:off x="1115616" y="1563638"/>
+            <a:off x="1691680" y="1563638"/>
             <a:ext cx="5544616" cy="3326770"/>
           </a:xfrm>
           <a:prstGeom prst="rect">
@@ -6315,13 +6319,6 @@
   <p:clrMapOvr>
     <a:masterClrMapping/>
   </p:clrMapOvr>
-  <p:timing>
-    <p:tnLst>
-      <p:par>
-        <p:cTn id="1" dur="indefinite" restart="never" nodeType="tmRoot"/>
-      </p:par>
-    </p:tnLst>
-  </p:timing>
 </p:sld>
 </file>
 
@@ -6363,19 +6360,18 @@
           <a:lstStyle/>
           <a:p>
             <a:r>
-              <a:rPr lang="en-GB" dirty="0" smtClean="0"/>
+              <a:rPr lang="en-GB" dirty="0"/>
               <a:t>Predictions from ARIMA models, by default ARIMA(3,1,2), based on 200 prior observations</a:t>
             </a:r>
           </a:p>
           <a:p>
-            <a:endParaRPr lang="en-GB" dirty="0" smtClean="0"/>
-          </a:p>
-          <a:p>
-            <a:r>
-              <a:rPr lang="en-GB" dirty="0" smtClean="0"/>
+            <a:endParaRPr lang="en-GB" dirty="0"/>
+          </a:p>
+          <a:p>
+            <a:r>
+              <a:rPr lang="en-GB" dirty="0"/>
               <a:t>Not fully implemented</a:t>
             </a:r>
-            <a:endParaRPr lang="en-GB" dirty="0"/>
           </a:p>
         </p:txBody>
       </p:sp>
@@ -6395,15 +6391,15 @@
           <a:lstStyle/>
           <a:p>
             <a:r>
-              <a:rPr lang="sk-SK" dirty="0" err="1" smtClean="0"/>
+              <a:rPr lang="sk-SK" dirty="0" err="1"/>
               <a:t>Medium-term</a:t>
             </a:r>
             <a:r>
-              <a:rPr lang="sk-SK" dirty="0" smtClean="0"/>
+              <a:rPr lang="sk-SK" dirty="0"/>
               <a:t> </a:t>
             </a:r>
             <a:r>
-              <a:rPr lang="sk-SK" dirty="0" err="1" smtClean="0"/>
+              <a:rPr lang="sk-SK" dirty="0" err="1"/>
               <a:t>corrections</a:t>
             </a:r>
             <a:endParaRPr lang="en-GB" dirty="0"/>
@@ -6415,13 +6411,6 @@
   <p:clrMapOvr>
     <a:masterClrMapping/>
   </p:clrMapOvr>
-  <p:timing>
-    <p:tnLst>
-      <p:par>
-        <p:cTn id="1" dur="indefinite" restart="never" nodeType="tmRoot"/>
-      </p:par>
-    </p:tnLst>
-  </p:timing>
 </p:sld>
 </file>
 
@@ -6458,55 +6447,48 @@
           <a:lstStyle/>
           <a:p>
             <a:r>
-              <a:rPr lang="sk-SK" dirty="0" err="1" smtClean="0"/>
+              <a:rPr lang="sk-SK" dirty="0"/>
               <a:t>Take</a:t>
             </a:r>
             <a:r>
-              <a:rPr lang="sk-SK" dirty="0" smtClean="0"/>
-              <a:t> </a:t>
-            </a:r>
-            <a:r>
-              <a:rPr lang="sk-SK" dirty="0" err="1" smtClean="0"/>
-              <a:t>advantage</a:t>
-            </a:r>
-            <a:r>
-              <a:rPr lang="sk-SK" dirty="0" smtClean="0"/>
-              <a:t> </a:t>
-            </a:r>
-            <a:r>
-              <a:rPr lang="sk-SK" dirty="0" err="1" smtClean="0"/>
-              <a:t>of</a:t>
-            </a:r>
-            <a:r>
-              <a:rPr lang="sk-SK" dirty="0" smtClean="0"/>
-              <a:t> </a:t>
-            </a:r>
-            <a:r>
-              <a:rPr lang="sk-SK" dirty="0" err="1" smtClean="0"/>
+              <a:rPr lang="en-US" dirty="0"/>
+              <a:t>s</a:t>
+            </a:r>
+            <a:r>
+              <a:rPr lang="sk-SK" dirty="0"/>
+              <a:t> advantage of </a:t>
+            </a:r>
+            <a:r>
+              <a:rPr lang="en-US" dirty="0"/>
+              <a:t>underlying </a:t>
+            </a:r>
+            <a:r>
+              <a:rPr lang="sk-SK" dirty="0"/>
               <a:t>cyclicity</a:t>
             </a:r>
-            <a:endParaRPr lang="sk-SK" dirty="0" smtClean="0"/>
-          </a:p>
-          <a:p>
-            <a:r>
-              <a:rPr lang="sk-SK" dirty="0" err="1" smtClean="0"/>
-              <a:t>Not</a:t>
-            </a:r>
-            <a:r>
-              <a:rPr lang="sk-SK" dirty="0" smtClean="0"/>
-              <a:t> </a:t>
-            </a:r>
-            <a:r>
-              <a:rPr lang="sk-SK" dirty="0" err="1" smtClean="0"/>
-              <a:t>yet</a:t>
-            </a:r>
-            <a:r>
-              <a:rPr lang="sk-SK" dirty="0" smtClean="0"/>
-              <a:t> </a:t>
-            </a:r>
-            <a:r>
-              <a:rPr lang="sk-SK" dirty="0" err="1" smtClean="0"/>
-              <a:t>implemented</a:t>
+            <a:r>
+              <a:rPr lang="en-US" dirty="0"/>
+              <a:t> in the data</a:t>
+            </a:r>
+          </a:p>
+          <a:p>
+            <a:pPr marL="109728" indent="0">
+              <a:buNone/>
+            </a:pPr>
+            <a:endParaRPr lang="sk-SK" dirty="0"/>
+          </a:p>
+          <a:p>
+            <a:r>
+              <a:rPr lang="sk-SK" dirty="0"/>
+              <a:t>Not yet</a:t>
+            </a:r>
+            <a:r>
+              <a:rPr lang="en-US" dirty="0"/>
+              <a:t> fully</a:t>
+            </a:r>
+            <a:r>
+              <a:rPr lang="sk-SK" dirty="0"/>
+              <a:t> implemented</a:t>
             </a:r>
             <a:endParaRPr lang="en-GB" dirty="0"/>
           </a:p>
@@ -6528,56 +6510,18 @@
           <a:lstStyle/>
           <a:p>
             <a:r>
-              <a:rPr lang="sk-SK" dirty="0" err="1" smtClean="0"/>
+              <a:rPr lang="sk-SK" dirty="0" err="1"/>
               <a:t>Long-term</a:t>
             </a:r>
             <a:r>
-              <a:rPr lang="sk-SK" dirty="0" smtClean="0"/>
+              <a:rPr lang="sk-SK" dirty="0"/>
               <a:t> </a:t>
             </a:r>
             <a:r>
-              <a:rPr lang="sk-SK" dirty="0" err="1" smtClean="0"/>
+              <a:rPr lang="sk-SK" dirty="0" err="1"/>
               <a:t>corrections</a:t>
             </a:r>
             <a:endParaRPr lang="en-GB" dirty="0"/>
-          </a:p>
-        </p:txBody>
-      </p:sp>
-      <p:sp>
-        <p:nvSpPr>
-          <p:cNvPr id="4" name="BlokTextu 3"/>
-          <p:cNvSpPr txBox="1"/>
-          <p:nvPr/>
-        </p:nvSpPr>
-        <p:spPr>
-          <a:xfrm>
-            <a:off x="7956376" y="4371950"/>
-            <a:ext cx="1008112" cy="307777"/>
-          </a:xfrm>
-          <a:prstGeom prst="rect">
-            <a:avLst/>
-          </a:prstGeom>
-          <a:noFill/>
-        </p:spPr>
-        <p:txBody>
-          <a:bodyPr wrap="square" rtlCol="0">
-            <a:spAutoFit/>
-          </a:bodyPr>
-          <a:lstStyle/>
-          <a:p>
-            <a:r>
-              <a:rPr lang="sk-SK" dirty="0" err="1" smtClean="0">
-                <a:solidFill>
-                  <a:srgbClr val="FF0000"/>
-                </a:solidFill>
-              </a:rPr>
-              <a:t>Stepan</a:t>
-            </a:r>
-            <a:endParaRPr lang="en-GB" dirty="0">
-              <a:solidFill>
-                <a:srgbClr val="FF0000"/>
-              </a:solidFill>
-            </a:endParaRPr>
           </a:p>
         </p:txBody>
       </p:sp>
@@ -6586,13 +6530,6 @@
   <p:clrMapOvr>
     <a:masterClrMapping/>
   </p:clrMapOvr>
-  <p:timing>
-    <p:tnLst>
-      <p:par>
-        <p:cTn id="1" dur="indefinite" restart="never" nodeType="tmRoot"/>
-      </p:par>
-    </p:tnLst>
-  </p:timing>
 </p:sld>
 </file>
 
@@ -6629,25 +6566,25 @@
           <a:lstStyle/>
           <a:p>
             <a:r>
-              <a:rPr lang="en-GB" dirty="0" smtClean="0"/>
+              <a:rPr lang="en-GB" dirty="0"/>
               <a:t>Graphical tools</a:t>
             </a:r>
           </a:p>
           <a:p>
-            <a:endParaRPr lang="en-GB" dirty="0" smtClean="0"/>
-          </a:p>
-          <a:p>
-            <a:r>
-              <a:rPr lang="en-GB" dirty="0" smtClean="0"/>
+            <a:endParaRPr lang="en-GB" dirty="0"/>
+          </a:p>
+          <a:p>
+            <a:r>
+              <a:rPr lang="en-GB" dirty="0"/>
               <a:t>Automated detection and corrections</a:t>
             </a:r>
           </a:p>
           <a:p>
-            <a:endParaRPr lang="en-GB" dirty="0" smtClean="0"/>
-          </a:p>
-          <a:p>
-            <a:r>
-              <a:rPr lang="en-GB" dirty="0" smtClean="0"/>
+            <a:endParaRPr lang="en-GB" dirty="0"/>
+          </a:p>
+          <a:p>
+            <a:r>
+              <a:rPr lang="en-GB" dirty="0"/>
               <a:t>Option for changing parameters for individual time series or even individual groups of errors</a:t>
             </a:r>
           </a:p>
@@ -6672,15 +6609,15 @@
           <a:lstStyle/>
           <a:p>
             <a:r>
-              <a:rPr lang="sk-SK" dirty="0" err="1" smtClean="0"/>
+              <a:rPr lang="sk-SK" dirty="0" err="1"/>
               <a:t>Python</a:t>
             </a:r>
             <a:r>
-              <a:rPr lang="sk-SK" dirty="0" smtClean="0"/>
+              <a:rPr lang="sk-SK" dirty="0"/>
               <a:t> </a:t>
             </a:r>
             <a:r>
-              <a:rPr lang="sk-SK" dirty="0" err="1" smtClean="0"/>
+              <a:rPr lang="sk-SK" dirty="0" err="1"/>
               <a:t>library</a:t>
             </a:r>
             <a:endParaRPr lang="en-GB" dirty="0"/>
@@ -6692,13 +6629,6 @@
   <p:clrMapOvr>
     <a:masterClrMapping/>
   </p:clrMapOvr>
-  <p:timing>
-    <p:tnLst>
-      <p:par>
-        <p:cTn id="1" dur="indefinite" restart="never" nodeType="tmRoot"/>
-      </p:par>
-    </p:tnLst>
-  </p:timing>
 </p:sld>
 </file>
 
@@ -6735,154 +6665,16 @@
           <a:lstStyle/>
           <a:p>
             <a:r>
-              <a:rPr lang="sk-SK" dirty="0" err="1" smtClean="0"/>
-              <a:t>Managed</a:t>
-            </a:r>
-            <a:r>
-              <a:rPr lang="sk-SK" dirty="0" smtClean="0"/>
-              <a:t> to </a:t>
-            </a:r>
-            <a:r>
-              <a:rPr lang="sk-SK" dirty="0" err="1" smtClean="0"/>
-              <a:t>create</a:t>
-            </a:r>
-            <a:r>
-              <a:rPr lang="sk-SK" dirty="0" smtClean="0"/>
-              <a:t> </a:t>
-            </a:r>
-            <a:r>
-              <a:rPr lang="sk-SK" dirty="0" err="1" smtClean="0"/>
-              <a:t>quite</a:t>
-            </a:r>
-            <a:r>
-              <a:rPr lang="sk-SK" dirty="0" smtClean="0"/>
-              <a:t> </a:t>
-            </a:r>
-            <a:r>
-              <a:rPr lang="sk-SK" dirty="0" err="1" smtClean="0"/>
-              <a:t>multi-functional</a:t>
-            </a:r>
-            <a:r>
-              <a:rPr lang="sk-SK" dirty="0" smtClean="0"/>
-              <a:t> </a:t>
-            </a:r>
-            <a:r>
-              <a:rPr lang="sk-SK" dirty="0" err="1" smtClean="0"/>
-              <a:t>library</a:t>
-            </a:r>
-            <a:r>
-              <a:rPr lang="sk-SK" dirty="0" smtClean="0"/>
-              <a:t> </a:t>
-            </a:r>
-            <a:r>
-              <a:rPr lang="sk-SK" dirty="0" err="1" smtClean="0"/>
-              <a:t>which</a:t>
-            </a:r>
-            <a:r>
-              <a:rPr lang="sk-SK" dirty="0" smtClean="0"/>
-              <a:t> </a:t>
-            </a:r>
-            <a:r>
-              <a:rPr lang="sk-SK" dirty="0" err="1" smtClean="0"/>
-              <a:t>can</a:t>
-            </a:r>
-            <a:r>
-              <a:rPr lang="sk-SK" dirty="0" smtClean="0"/>
-              <a:t> </a:t>
-            </a:r>
-            <a:r>
-              <a:rPr lang="sk-SK" dirty="0" err="1" smtClean="0"/>
-              <a:t>be</a:t>
-            </a:r>
-            <a:r>
-              <a:rPr lang="sk-SK" dirty="0" smtClean="0"/>
-              <a:t> </a:t>
-            </a:r>
-            <a:r>
-              <a:rPr lang="sk-SK" dirty="0" err="1" smtClean="0"/>
-              <a:t>easily</a:t>
-            </a:r>
-            <a:r>
-              <a:rPr lang="sk-SK" dirty="0" smtClean="0"/>
-              <a:t> </a:t>
-            </a:r>
-            <a:r>
-              <a:rPr lang="sk-SK" dirty="0" err="1" smtClean="0"/>
-              <a:t>used</a:t>
-            </a:r>
-            <a:r>
-              <a:rPr lang="sk-SK" dirty="0" smtClean="0"/>
-              <a:t> </a:t>
-            </a:r>
-            <a:r>
-              <a:rPr lang="sk-SK" dirty="0" err="1" smtClean="0"/>
-              <a:t>for</a:t>
-            </a:r>
-            <a:r>
-              <a:rPr lang="sk-SK" dirty="0" smtClean="0"/>
-              <a:t> </a:t>
-            </a:r>
-            <a:r>
-              <a:rPr lang="sk-SK" dirty="0" err="1" smtClean="0"/>
-              <a:t>automatized</a:t>
-            </a:r>
-            <a:r>
-              <a:rPr lang="sk-SK" dirty="0" smtClean="0"/>
-              <a:t> </a:t>
-            </a:r>
-            <a:r>
-              <a:rPr lang="sk-SK" dirty="0" err="1" smtClean="0"/>
-              <a:t>detection</a:t>
-            </a:r>
-            <a:r>
-              <a:rPr lang="sk-SK" dirty="0" smtClean="0"/>
-              <a:t> and </a:t>
-            </a:r>
-            <a:r>
-              <a:rPr lang="sk-SK" dirty="0" err="1" smtClean="0"/>
-              <a:t>partially</a:t>
-            </a:r>
-            <a:r>
-              <a:rPr lang="sk-SK" dirty="0" smtClean="0"/>
-              <a:t> </a:t>
-            </a:r>
-            <a:r>
-              <a:rPr lang="sk-SK" dirty="0" err="1" smtClean="0"/>
-              <a:t>also</a:t>
-            </a:r>
-            <a:r>
-              <a:rPr lang="sk-SK" dirty="0" smtClean="0"/>
-              <a:t> </a:t>
-            </a:r>
-            <a:r>
-              <a:rPr lang="sk-SK" dirty="0" err="1" smtClean="0"/>
-              <a:t>for</a:t>
-            </a:r>
-            <a:r>
-              <a:rPr lang="sk-SK" dirty="0" smtClean="0"/>
-              <a:t> </a:t>
-            </a:r>
-            <a:r>
-              <a:rPr lang="sk-SK" dirty="0" err="1" smtClean="0"/>
-              <a:t>correction</a:t>
-            </a:r>
-            <a:r>
-              <a:rPr lang="sk-SK" dirty="0" smtClean="0"/>
-              <a:t> </a:t>
-            </a:r>
-            <a:r>
-              <a:rPr lang="sk-SK" dirty="0" err="1" smtClean="0"/>
-              <a:t>of</a:t>
-            </a:r>
-            <a:r>
-              <a:rPr lang="sk-SK" dirty="0" smtClean="0"/>
-              <a:t> </a:t>
-            </a:r>
-            <a:r>
-              <a:rPr lang="sk-SK" dirty="0" err="1" smtClean="0"/>
-              <a:t>errors</a:t>
-            </a:r>
-            <a:endParaRPr lang="en-GB" dirty="0"/>
+              <a:rPr lang="sk-SK" dirty="0"/>
+              <a:t>Managed to create multi-functional library which can be easily used for automatized detection and partially also for correction of errors</a:t>
+            </a:r>
+            <a:endParaRPr lang="en-US" dirty="0"/>
+          </a:p>
+          <a:p>
+            <a:r>
+              <a:rPr lang="en-US" dirty="0"/>
+              <a:t>Functions are highly customizable</a:t>
+            </a:r>
           </a:p>
         </p:txBody>
       </p:sp>
@@ -6902,48 +6694,10 @@
           <a:lstStyle/>
           <a:p>
             <a:r>
-              <a:rPr lang="sk-SK" dirty="0" err="1" smtClean="0"/>
+              <a:rPr lang="sk-SK" dirty="0" err="1"/>
               <a:t>Conclusion</a:t>
             </a:r>
             <a:endParaRPr lang="en-GB" dirty="0"/>
-          </a:p>
-        </p:txBody>
-      </p:sp>
-      <p:sp>
-        <p:nvSpPr>
-          <p:cNvPr id="4" name="BlokTextu 3"/>
-          <p:cNvSpPr txBox="1"/>
-          <p:nvPr/>
-        </p:nvSpPr>
-        <p:spPr>
-          <a:xfrm>
-            <a:off x="7956376" y="4371950"/>
-            <a:ext cx="1008112" cy="307777"/>
-          </a:xfrm>
-          <a:prstGeom prst="rect">
-            <a:avLst/>
-          </a:prstGeom>
-          <a:noFill/>
-        </p:spPr>
-        <p:txBody>
-          <a:bodyPr wrap="square" rtlCol="0">
-            <a:spAutoFit/>
-          </a:bodyPr>
-          <a:lstStyle/>
-          <a:p>
-            <a:r>
-              <a:rPr lang="sk-SK" dirty="0" err="1" smtClean="0">
-                <a:solidFill>
-                  <a:srgbClr val="FF0000"/>
-                </a:solidFill>
-              </a:rPr>
-              <a:t>Stepan</a:t>
-            </a:r>
-            <a:endParaRPr lang="en-GB" dirty="0">
-              <a:solidFill>
-                <a:srgbClr val="FF0000"/>
-              </a:solidFill>
-            </a:endParaRPr>
           </a:p>
         </p:txBody>
       </p:sp>
@@ -6952,13 +6706,6 @@
   <p:clrMapOvr>
     <a:masterClrMapping/>
   </p:clrMapOvr>
-  <p:timing>
-    <p:tnLst>
-      <p:par>
-        <p:cTn id="1" dur="indefinite" restart="never" nodeType="tmRoot"/>
-      </p:par>
-    </p:tnLst>
-  </p:timing>
 </p:sld>
 </file>
 
@@ -7014,43 +6761,43 @@
               <a:buNone/>
             </a:pPr>
             <a:r>
-              <a:rPr lang="sk-SK" dirty="0" err="1" smtClean="0"/>
+              <a:rPr lang="sk-SK" dirty="0" err="1"/>
               <a:t>Thank</a:t>
             </a:r>
             <a:r>
-              <a:rPr lang="sk-SK" dirty="0" smtClean="0"/>
+              <a:rPr lang="sk-SK" dirty="0"/>
               <a:t> </a:t>
             </a:r>
             <a:r>
-              <a:rPr lang="sk-SK" dirty="0" err="1" smtClean="0"/>
+              <a:rPr lang="sk-SK" dirty="0" err="1"/>
               <a:t>you</a:t>
             </a:r>
             <a:r>
-              <a:rPr lang="sk-SK" dirty="0" smtClean="0"/>
+              <a:rPr lang="sk-SK" dirty="0"/>
               <a:t> </a:t>
             </a:r>
             <a:r>
-              <a:rPr lang="sk-SK" dirty="0" err="1" smtClean="0"/>
+              <a:rPr lang="sk-SK" dirty="0" err="1"/>
               <a:t>for</a:t>
             </a:r>
             <a:r>
-              <a:rPr lang="sk-SK" dirty="0" smtClean="0"/>
+              <a:rPr lang="sk-SK" dirty="0"/>
               <a:t> </a:t>
             </a:r>
             <a:r>
-              <a:rPr lang="sk-SK" dirty="0" err="1" smtClean="0"/>
+              <a:rPr lang="sk-SK" dirty="0" err="1"/>
               <a:t>your</a:t>
             </a:r>
             <a:r>
-              <a:rPr lang="sk-SK" dirty="0" smtClean="0"/>
+              <a:rPr lang="sk-SK" dirty="0"/>
               <a:t> </a:t>
             </a:r>
             <a:r>
-              <a:rPr lang="sk-SK" dirty="0" err="1" smtClean="0"/>
+              <a:rPr lang="sk-SK" dirty="0" err="1"/>
               <a:t>attention</a:t>
             </a:r>
             <a:r>
-              <a:rPr lang="sk-SK" dirty="0" smtClean="0"/>
+              <a:rPr lang="sk-SK" dirty="0"/>
               <a:t>!</a:t>
             </a:r>
             <a:endParaRPr dirty="0"/>
@@ -7134,13 +6881,6 @@
   <p:clrMapOvr>
     <a:masterClrMapping/>
   </p:clrMapOvr>
-  <p:timing>
-    <p:tnLst>
-      <p:par>
-        <p:cTn id="1" dur="indefinite" restart="never" nodeType="tmRoot"/>
-      </p:par>
-    </p:tnLst>
-  </p:timing>
 </p:sld>
 </file>
 
@@ -7184,24 +6924,24 @@
           <a:lstStyle/>
           <a:p>
             <a:r>
-              <a:rPr lang="en-GB" dirty="0" smtClean="0"/>
+              <a:rPr lang="en-GB" dirty="0"/>
               <a:t>Assigned by DHI, a water management company</a:t>
             </a:r>
           </a:p>
           <a:p>
-            <a:endParaRPr lang="en-GB" dirty="0" smtClean="0"/>
-          </a:p>
-          <a:p>
-            <a:r>
-              <a:rPr lang="en-GB" dirty="0" smtClean="0"/>
+            <a:endParaRPr lang="en-GB" dirty="0"/>
+          </a:p>
+          <a:p>
+            <a:r>
+              <a:rPr lang="en-GB" dirty="0"/>
               <a:t>Automat</a:t>
             </a:r>
             <a:r>
-              <a:rPr lang="sk-SK" dirty="0" smtClean="0"/>
+              <a:rPr lang="sk-SK" dirty="0"/>
               <a:t>e</a:t>
             </a:r>
             <a:r>
-              <a:rPr lang="en-GB" dirty="0" smtClean="0"/>
+              <a:rPr lang="en-GB" dirty="0"/>
               <a:t>d detection and correction of errors</a:t>
             </a:r>
           </a:p>
@@ -7210,48 +6950,46 @@
               <a:buNone/>
             </a:pPr>
             <a:r>
-              <a:rPr lang="en-GB" dirty="0" smtClean="0"/>
+              <a:rPr lang="en-GB" dirty="0"/>
               <a:t>in time series of waste-water measurements</a:t>
             </a:r>
-            <a:endParaRPr lang="en-GB" dirty="0" smtClean="0"/>
-          </a:p>
-          <a:p>
-            <a:endParaRPr lang="en-GB" dirty="0" smtClean="0"/>
-          </a:p>
-          <a:p>
-            <a:r>
-              <a:rPr lang="en-GB" dirty="0" smtClean="0"/>
+          </a:p>
+          <a:p>
+            <a:endParaRPr lang="en-GB" dirty="0"/>
+          </a:p>
+          <a:p>
+            <a:r>
+              <a:rPr lang="en-GB" dirty="0"/>
               <a:t>Constraints given by the client</a:t>
             </a:r>
             <a:r>
-              <a:rPr lang="sk-SK" dirty="0" smtClean="0"/>
+              <a:rPr lang="sk-SK" dirty="0"/>
               <a:t>: </a:t>
             </a:r>
             <a:r>
-              <a:rPr lang="en-GB" dirty="0" smtClean="0"/>
+              <a:rPr lang="en-GB" dirty="0"/>
               <a:t>no targets, </a:t>
             </a:r>
             <a:r>
-              <a:rPr lang="en-GB" dirty="0" err="1" smtClean="0"/>
+              <a:rPr lang="en-GB" dirty="0" err="1"/>
               <a:t>univariate</a:t>
             </a:r>
             <a:r>
-              <a:rPr lang="en-GB" dirty="0" smtClean="0"/>
+              <a:rPr lang="en-GB" dirty="0"/>
               <a:t> </a:t>
             </a:r>
-            <a:endParaRPr lang="en-GB" dirty="0" smtClean="0"/>
-          </a:p>
-          <a:p>
-            <a:endParaRPr lang="en-GB" dirty="0" smtClean="0"/>
-          </a:p>
-          <a:p>
-            <a:r>
-              <a:rPr lang="en-GB" dirty="0" smtClean="0"/>
+          </a:p>
+          <a:p>
+            <a:endParaRPr lang="en-GB" dirty="0"/>
+          </a:p>
+          <a:p>
+            <a:r>
+              <a:rPr lang="en-GB" dirty="0"/>
               <a:t>Output: practically usable Python library</a:t>
             </a:r>
           </a:p>
           <a:p>
-            <a:endParaRPr lang="sk-SK" dirty="0" smtClean="0"/>
+            <a:endParaRPr lang="sk-SK" dirty="0"/>
           </a:p>
         </p:txBody>
       </p:sp>
@@ -7276,11 +7014,11 @@
           <a:lstStyle/>
           <a:p>
             <a:r>
-              <a:rPr lang="sk-SK" dirty="0" err="1" smtClean="0"/>
+              <a:rPr lang="sk-SK" dirty="0" err="1"/>
               <a:t>Task</a:t>
             </a:r>
             <a:r>
-              <a:rPr lang="sk-SK" dirty="0" smtClean="0"/>
+              <a:rPr lang="sk-SK" dirty="0"/>
               <a:t> </a:t>
             </a:r>
             <a:endParaRPr lang="en-GB" dirty="0"/>
@@ -7292,13 +7030,6 @@
   <p:clrMapOvr>
     <a:masterClrMapping/>
   </p:clrMapOvr>
-  <p:timing>
-    <p:tnLst>
-      <p:par>
-        <p:cTn id="1" dur="indefinite" restart="never" nodeType="tmRoot"/>
-      </p:par>
-    </p:tnLst>
-  </p:timing>
 </p:sld>
 </file>
 
@@ -7335,83 +7066,30 @@
           <a:lstStyle/>
           <a:p>
             <a:r>
-              <a:rPr lang="sk-SK" dirty="0" smtClean="0"/>
-              <a:t>8 </a:t>
-            </a:r>
-            <a:r>
-              <a:rPr lang="sk-SK" dirty="0" err="1" smtClean="0"/>
-              <a:t>time</a:t>
-            </a:r>
-            <a:r>
-              <a:rPr lang="sk-SK" dirty="0" smtClean="0"/>
-              <a:t> </a:t>
-            </a:r>
-            <a:r>
-              <a:rPr lang="sk-SK" dirty="0" err="1" smtClean="0"/>
-              <a:t>series</a:t>
-            </a:r>
-            <a:r>
-              <a:rPr lang="sk-SK" dirty="0" smtClean="0"/>
-              <a:t>, </a:t>
-            </a:r>
-            <a:r>
-              <a:rPr lang="sk-SK" dirty="0" err="1" smtClean="0"/>
-              <a:t>each</a:t>
-            </a:r>
-            <a:r>
-              <a:rPr lang="sk-SK" dirty="0" smtClean="0"/>
-              <a:t> </a:t>
-            </a:r>
-            <a:r>
-              <a:rPr lang="sk-SK" dirty="0" err="1" smtClean="0"/>
-              <a:t>several</a:t>
-            </a:r>
-            <a:r>
-              <a:rPr lang="sk-SK" dirty="0" smtClean="0"/>
-              <a:t> </a:t>
-            </a:r>
-            <a:r>
-              <a:rPr lang="sk-SK" dirty="0" err="1" smtClean="0"/>
-              <a:t>moths</a:t>
-            </a:r>
-            <a:r>
-              <a:rPr lang="sk-SK" dirty="0" smtClean="0"/>
-              <a:t> </a:t>
-            </a:r>
-            <a:r>
-              <a:rPr lang="sk-SK" dirty="0" err="1" smtClean="0"/>
-              <a:t>long</a:t>
-            </a:r>
-            <a:endParaRPr lang="sk-SK" dirty="0" smtClean="0"/>
-          </a:p>
-          <a:p>
-            <a:r>
-              <a:rPr lang="sk-SK" dirty="0" err="1" smtClean="0"/>
-              <a:t>Noisy</a:t>
-            </a:r>
-            <a:r>
-              <a:rPr lang="sk-SK" dirty="0" smtClean="0"/>
-              <a:t>, </a:t>
-            </a:r>
-            <a:r>
-              <a:rPr lang="sk-SK" dirty="0" err="1" smtClean="0"/>
-              <a:t>rain</a:t>
-            </a:r>
-            <a:r>
-              <a:rPr lang="sk-SK" dirty="0" smtClean="0"/>
-              <a:t> has </a:t>
-            </a:r>
-            <a:r>
-              <a:rPr lang="sk-SK" dirty="0" err="1" smtClean="0"/>
-              <a:t>large</a:t>
-            </a:r>
-            <a:r>
-              <a:rPr lang="sk-SK" dirty="0" smtClean="0"/>
-              <a:t> </a:t>
-            </a:r>
-            <a:r>
-              <a:rPr lang="sk-SK" dirty="0" err="1" smtClean="0"/>
-              <a:t>impact</a:t>
+              <a:rPr lang="sk-SK" dirty="0"/>
+              <a:t>8 time series, each </a:t>
+            </a:r>
+            <a:r>
+              <a:rPr lang="en-US" dirty="0"/>
+              <a:t>1 to 3 </a:t>
+            </a:r>
+            <a:r>
+              <a:rPr lang="sk-SK" dirty="0"/>
+              <a:t>mo</a:t>
+            </a:r>
+            <a:r>
+              <a:rPr lang="en-US" dirty="0"/>
+              <a:t>n</a:t>
+            </a:r>
+            <a:r>
+              <a:rPr lang="sk-SK" dirty="0"/>
+              <a:t>ths long</a:t>
+            </a:r>
+          </a:p>
+          <a:p>
+            <a:r>
+              <a:rPr lang="en-US" dirty="0"/>
+              <a:t>Natural daily cyclicity, big impact of rain</a:t>
             </a:r>
             <a:endParaRPr lang="en-GB" dirty="0"/>
           </a:p>
@@ -7433,48 +7111,10 @@
           <a:lstStyle/>
           <a:p>
             <a:r>
-              <a:rPr lang="sk-SK" dirty="0" err="1" smtClean="0"/>
+              <a:rPr lang="sk-SK" dirty="0" err="1"/>
               <a:t>Data</a:t>
             </a:r>
             <a:endParaRPr lang="en-GB" dirty="0"/>
-          </a:p>
-        </p:txBody>
-      </p:sp>
-      <p:sp>
-        <p:nvSpPr>
-          <p:cNvPr id="4" name="BlokTextu 3"/>
-          <p:cNvSpPr txBox="1"/>
-          <p:nvPr/>
-        </p:nvSpPr>
-        <p:spPr>
-          <a:xfrm>
-            <a:off x="7956376" y="4371950"/>
-            <a:ext cx="1008112" cy="307777"/>
-          </a:xfrm>
-          <a:prstGeom prst="rect">
-            <a:avLst/>
-          </a:prstGeom>
-          <a:noFill/>
-        </p:spPr>
-        <p:txBody>
-          <a:bodyPr wrap="square" rtlCol="0">
-            <a:spAutoFit/>
-          </a:bodyPr>
-          <a:lstStyle/>
-          <a:p>
-            <a:r>
-              <a:rPr lang="sk-SK" dirty="0" err="1" smtClean="0">
-                <a:solidFill>
-                  <a:srgbClr val="FF0000"/>
-                </a:solidFill>
-              </a:rPr>
-              <a:t>Stepan</a:t>
-            </a:r>
-            <a:endParaRPr lang="en-GB" dirty="0">
-              <a:solidFill>
-                <a:srgbClr val="FF0000"/>
-              </a:solidFill>
-            </a:endParaRPr>
           </a:p>
         </p:txBody>
       </p:sp>
@@ -7494,7 +7134,7 @@
         </p:blipFill>
         <p:spPr>
           <a:xfrm>
-            <a:off x="755576" y="2053292"/>
+            <a:off x="1907704" y="2064330"/>
             <a:ext cx="5150347" cy="3090208"/>
           </a:xfrm>
           <a:prstGeom prst="rect">
@@ -7507,13 +7147,6 @@
   <p:clrMapOvr>
     <a:masterClrMapping/>
   </p:clrMapOvr>
-  <p:timing>
-    <p:tnLst>
-      <p:par>
-        <p:cTn id="1" dur="indefinite" restart="never" nodeType="tmRoot"/>
-      </p:par>
-    </p:tnLst>
-  </p:timing>
 </p:sld>
 </file>
 
@@ -7550,57 +7183,55 @@
           <a:lstStyle/>
           <a:p>
             <a:r>
-              <a:rPr lang="sk-SK" dirty="0" err="1" smtClean="0"/>
-              <a:t>Machine</a:t>
-            </a:r>
-            <a:r>
-              <a:rPr lang="sk-SK" dirty="0" smtClean="0"/>
+              <a:rPr lang="sk-SK" dirty="0"/>
+              <a:t>Machine learning methods</a:t>
+            </a:r>
+            <a:endParaRPr lang="en-US" dirty="0"/>
+          </a:p>
+          <a:p>
+            <a:pPr lvl="1"/>
+            <a:r>
+              <a:rPr lang="en-US" dirty="0" err="1"/>
+              <a:t>Kmeans</a:t>
+            </a:r>
+            <a:r>
+              <a:rPr lang="en-US" dirty="0"/>
+              <a:t> clustering, Autoencoder</a:t>
+            </a:r>
+          </a:p>
+          <a:p>
+            <a:pPr marL="393192" lvl="1" indent="0">
+              <a:buNone/>
+            </a:pPr>
+            <a:endParaRPr lang="sk-SK" dirty="0"/>
+          </a:p>
+          <a:p>
+            <a:r>
+              <a:rPr lang="sk-SK" dirty="0" err="1"/>
+              <a:t>Visual</a:t>
+            </a:r>
+            <a:r>
+              <a:rPr lang="sk-SK" dirty="0"/>
               <a:t> </a:t>
             </a:r>
             <a:r>
-              <a:rPr lang="sk-SK" dirty="0" err="1" smtClean="0"/>
-              <a:t>learning</a:t>
-            </a:r>
-            <a:r>
-              <a:rPr lang="sk-SK" dirty="0" smtClean="0"/>
+              <a:rPr lang="sk-SK" dirty="0" err="1"/>
+              <a:t>inspection</a:t>
+            </a:r>
+            <a:r>
+              <a:rPr lang="sk-SK" dirty="0"/>
+              <a:t> and </a:t>
+            </a:r>
+            <a:r>
+              <a:rPr lang="sk-SK" dirty="0" err="1"/>
+              <a:t>heurisitcal</a:t>
+            </a:r>
+            <a:r>
+              <a:rPr lang="sk-SK" dirty="0"/>
               <a:t> </a:t>
             </a:r>
             <a:r>
-              <a:rPr lang="sk-SK" dirty="0" err="1" smtClean="0"/>
-              <a:t>methods</a:t>
-            </a:r>
-            <a:endParaRPr lang="sk-SK" dirty="0" smtClean="0"/>
-          </a:p>
-          <a:p>
-            <a:endParaRPr lang="sk-SK" dirty="0" smtClean="0"/>
-          </a:p>
-          <a:p>
-            <a:r>
-              <a:rPr lang="sk-SK" dirty="0" err="1" smtClean="0"/>
-              <a:t>Visual</a:t>
-            </a:r>
-            <a:r>
-              <a:rPr lang="sk-SK" dirty="0" smtClean="0"/>
-              <a:t> </a:t>
-            </a:r>
-            <a:r>
-              <a:rPr lang="sk-SK" dirty="0" err="1" smtClean="0"/>
-              <a:t>inspection</a:t>
-            </a:r>
-            <a:r>
-              <a:rPr lang="sk-SK" dirty="0" smtClean="0"/>
-              <a:t> and </a:t>
-            </a:r>
-            <a:r>
-              <a:rPr lang="sk-SK" dirty="0" err="1" smtClean="0"/>
-              <a:t>heurisitcal</a:t>
-            </a:r>
-            <a:r>
-              <a:rPr lang="sk-SK" dirty="0" smtClean="0"/>
-              <a:t> </a:t>
-            </a:r>
-            <a:r>
-              <a:rPr lang="sk-SK" dirty="0" err="1" smtClean="0"/>
+              <a:rPr lang="sk-SK" dirty="0" err="1"/>
               <a:t>methods</a:t>
             </a:r>
             <a:endParaRPr lang="en-GB" dirty="0"/>
@@ -7623,64 +7254,26 @@
           <a:lstStyle/>
           <a:p>
             <a:r>
-              <a:rPr lang="sk-SK" dirty="0" err="1" smtClean="0"/>
+              <a:rPr lang="sk-SK" dirty="0" err="1"/>
               <a:t>Detection</a:t>
             </a:r>
             <a:r>
-              <a:rPr lang="sk-SK" dirty="0" smtClean="0"/>
+              <a:rPr lang="sk-SK" dirty="0"/>
               <a:t> </a:t>
             </a:r>
             <a:r>
-              <a:rPr lang="sk-SK" dirty="0" err="1" smtClean="0"/>
+              <a:rPr lang="sk-SK" dirty="0" err="1"/>
               <a:t>of</a:t>
             </a:r>
             <a:r>
-              <a:rPr lang="sk-SK" dirty="0" smtClean="0"/>
+              <a:rPr lang="sk-SK" dirty="0"/>
               <a:t> </a:t>
             </a:r>
             <a:r>
-              <a:rPr lang="sk-SK" dirty="0" err="1" smtClean="0"/>
+              <a:rPr lang="sk-SK" dirty="0" err="1"/>
               <a:t>events</a:t>
             </a:r>
             <a:endParaRPr lang="en-GB" dirty="0"/>
-          </a:p>
-        </p:txBody>
-      </p:sp>
-      <p:sp>
-        <p:nvSpPr>
-          <p:cNvPr id="4" name="BlokTextu 3"/>
-          <p:cNvSpPr txBox="1"/>
-          <p:nvPr/>
-        </p:nvSpPr>
-        <p:spPr>
-          <a:xfrm>
-            <a:off x="7956376" y="4371950"/>
-            <a:ext cx="1008112" cy="307777"/>
-          </a:xfrm>
-          <a:prstGeom prst="rect">
-            <a:avLst/>
-          </a:prstGeom>
-          <a:noFill/>
-        </p:spPr>
-        <p:txBody>
-          <a:bodyPr wrap="square" rtlCol="0">
-            <a:spAutoFit/>
-          </a:bodyPr>
-          <a:lstStyle/>
-          <a:p>
-            <a:r>
-              <a:rPr lang="sk-SK" dirty="0" err="1" smtClean="0">
-                <a:solidFill>
-                  <a:srgbClr val="FF0000"/>
-                </a:solidFill>
-              </a:rPr>
-              <a:t>Stepan</a:t>
-            </a:r>
-            <a:endParaRPr lang="en-GB" dirty="0">
-              <a:solidFill>
-                <a:srgbClr val="FF0000"/>
-              </a:solidFill>
-            </a:endParaRPr>
           </a:p>
         </p:txBody>
       </p:sp>
@@ -7689,13 +7282,6 @@
   <p:clrMapOvr>
     <a:masterClrMapping/>
   </p:clrMapOvr>
-  <p:timing>
-    <p:tnLst>
-      <p:par>
-        <p:cTn id="1" dur="indefinite" restart="never" nodeType="tmRoot"/>
-      </p:par>
-    </p:tnLst>
-  </p:timing>
 </p:sld>
 </file>
 
@@ -7737,28 +7323,27 @@
           <a:lstStyle/>
           <a:p>
             <a:r>
-              <a:rPr lang="en-US" dirty="0" smtClean="0"/>
+              <a:rPr lang="en-US" dirty="0"/>
               <a:t>Zero and constant values</a:t>
             </a:r>
           </a:p>
           <a:p>
-            <a:endParaRPr lang="en-US" dirty="0" smtClean="0"/>
-          </a:p>
-          <a:p>
-            <a:r>
-              <a:rPr lang="en-US" dirty="0" smtClean="0"/>
+            <a:endParaRPr lang="en-US" dirty="0"/>
+          </a:p>
+          <a:p>
+            <a:r>
+              <a:rPr lang="en-US" dirty="0"/>
               <a:t>Outliers and prolonged drops</a:t>
             </a:r>
           </a:p>
           <a:p>
-            <a:endParaRPr lang="en-US" dirty="0" smtClean="0"/>
-          </a:p>
-          <a:p>
-            <a:r>
-              <a:rPr lang="en-US" dirty="0" smtClean="0"/>
+            <a:endParaRPr lang="en-US" dirty="0"/>
+          </a:p>
+          <a:p>
+            <a:r>
+              <a:rPr lang="en-US" dirty="0"/>
               <a:t>Heightened volatility</a:t>
             </a:r>
-            <a:endParaRPr lang="en-US" dirty="0"/>
           </a:p>
         </p:txBody>
       </p:sp>
@@ -7778,23 +7363,23 @@
           <a:lstStyle/>
           <a:p>
             <a:r>
-              <a:rPr lang="sk-SK" dirty="0" err="1" smtClean="0"/>
+              <a:rPr lang="sk-SK" dirty="0" err="1"/>
               <a:t>Types</a:t>
             </a:r>
             <a:r>
-              <a:rPr lang="sk-SK" dirty="0" smtClean="0"/>
+              <a:rPr lang="sk-SK" dirty="0"/>
               <a:t> </a:t>
             </a:r>
             <a:r>
-              <a:rPr lang="sk-SK" dirty="0" err="1" smtClean="0"/>
+              <a:rPr lang="sk-SK" dirty="0" err="1"/>
               <a:t>of</a:t>
             </a:r>
             <a:r>
-              <a:rPr lang="sk-SK" dirty="0" smtClean="0"/>
+              <a:rPr lang="sk-SK" dirty="0"/>
               <a:t> </a:t>
             </a:r>
             <a:r>
-              <a:rPr lang="sk-SK" dirty="0" err="1" smtClean="0"/>
+              <a:rPr lang="sk-SK" dirty="0" err="1"/>
               <a:t>errors</a:t>
             </a:r>
             <a:endParaRPr lang="en-GB" dirty="0"/>
@@ -7806,13 +7391,6 @@
   <p:clrMapOvr>
     <a:masterClrMapping/>
   </p:clrMapOvr>
-  <p:timing>
-    <p:tnLst>
-      <p:par>
-        <p:cTn id="1" dur="indefinite" restart="never" nodeType="tmRoot"/>
-      </p:par>
-    </p:tnLst>
-  </p:timing>
 </p:sld>
 </file>
 
@@ -7849,10 +7427,9 @@
           <a:lstStyle/>
           <a:p>
             <a:r>
-              <a:rPr lang="en-GB" dirty="0" smtClean="0"/>
+              <a:rPr lang="en-GB" dirty="0"/>
               <a:t>Straightforward, easy to identify</a:t>
             </a:r>
-            <a:endParaRPr lang="en-GB" dirty="0"/>
           </a:p>
         </p:txBody>
       </p:sp>
@@ -7872,23 +7449,23 @@
           <a:lstStyle/>
           <a:p>
             <a:r>
-              <a:rPr lang="sk-SK" dirty="0" err="1" smtClean="0"/>
+              <a:rPr lang="sk-SK" dirty="0" err="1"/>
               <a:t>Zero</a:t>
             </a:r>
             <a:r>
-              <a:rPr lang="sk-SK" dirty="0" smtClean="0"/>
+              <a:rPr lang="sk-SK" dirty="0"/>
               <a:t> and </a:t>
             </a:r>
             <a:r>
-              <a:rPr lang="sk-SK" dirty="0" err="1" smtClean="0"/>
+              <a:rPr lang="sk-SK" dirty="0" err="1"/>
               <a:t>constant</a:t>
             </a:r>
             <a:r>
-              <a:rPr lang="sk-SK" dirty="0" smtClean="0"/>
+              <a:rPr lang="sk-SK" dirty="0"/>
               <a:t> </a:t>
             </a:r>
             <a:r>
-              <a:rPr lang="sk-SK" dirty="0" err="1" smtClean="0"/>
+              <a:rPr lang="sk-SK" dirty="0" err="1"/>
               <a:t>values</a:t>
             </a:r>
             <a:endParaRPr lang="en-GB" dirty="0"/>
@@ -7948,13 +7525,6 @@
   <p:clrMapOvr>
     <a:masterClrMapping/>
   </p:clrMapOvr>
-  <p:timing>
-    <p:tnLst>
-      <p:par>
-        <p:cTn id="1" dur="indefinite" restart="never" nodeType="tmRoot"/>
-      </p:par>
-    </p:tnLst>
-  </p:timing>
 </p:sld>
 </file>
 
@@ -8015,10 +7585,9 @@
           <a:lstStyle/>
           <a:p>
             <a:r>
-              <a:rPr lang="en-GB" dirty="0" smtClean="0"/>
+              <a:rPr lang="en-GB" dirty="0"/>
               <a:t>Large jump there and back again</a:t>
             </a:r>
-            <a:endParaRPr lang="en-GB" dirty="0"/>
           </a:p>
         </p:txBody>
       </p:sp>
@@ -8038,7 +7607,7 @@
           <a:lstStyle/>
           <a:p>
             <a:r>
-              <a:rPr lang="sk-SK" dirty="0" err="1" smtClean="0"/>
+              <a:rPr lang="sk-SK" dirty="0" err="1"/>
               <a:t>Outliers</a:t>
             </a:r>
             <a:endParaRPr lang="en-GB" dirty="0"/>
@@ -8050,13 +7619,6 @@
   <p:clrMapOvr>
     <a:masterClrMapping/>
   </p:clrMapOvr>
-  <p:timing>
-    <p:tnLst>
-      <p:par>
-        <p:cTn id="1" dur="indefinite" restart="never" nodeType="tmRoot"/>
-      </p:par>
-    </p:tnLst>
-  </p:timing>
 </p:sld>
 </file>
 
@@ -8093,48 +7655,16 @@
           <a:lstStyle/>
           <a:p>
             <a:r>
-              <a:rPr lang="sk-SK" dirty="0" err="1" smtClean="0"/>
-              <a:t>Measurements</a:t>
-            </a:r>
-            <a:r>
-              <a:rPr lang="sk-SK" dirty="0" smtClean="0"/>
-              <a:t> are </a:t>
-            </a:r>
-            <a:r>
-              <a:rPr lang="sk-SK" dirty="0" err="1" smtClean="0"/>
-              <a:t>hindered</a:t>
-            </a:r>
-            <a:r>
-              <a:rPr lang="sk-SK" dirty="0" smtClean="0"/>
-              <a:t> </a:t>
-            </a:r>
-            <a:r>
-              <a:rPr lang="sk-SK" dirty="0" err="1" smtClean="0"/>
-              <a:t>for</a:t>
-            </a:r>
-            <a:r>
-              <a:rPr lang="sk-SK" dirty="0" smtClean="0"/>
-              <a:t> </a:t>
-            </a:r>
-            <a:r>
-              <a:rPr lang="sk-SK" dirty="0" err="1" smtClean="0"/>
-              <a:t>some</a:t>
-            </a:r>
-            <a:r>
-              <a:rPr lang="sk-SK" dirty="0" smtClean="0"/>
-              <a:t> </a:t>
-            </a:r>
-            <a:r>
-              <a:rPr lang="sk-SK" dirty="0" err="1" smtClean="0"/>
-              <a:t>longer</a:t>
-            </a:r>
-            <a:r>
-              <a:rPr lang="sk-SK" dirty="0" smtClean="0"/>
-              <a:t> </a:t>
-            </a:r>
-            <a:r>
-              <a:rPr lang="sk-SK" dirty="0" err="1" smtClean="0"/>
-              <a:t>time</a:t>
+              <a:rPr lang="sk-SK" dirty="0"/>
+              <a:t>Measurements are hindered for </a:t>
+            </a:r>
+            <a:r>
+              <a:rPr lang="en-US" dirty="0"/>
+              <a:t>a</a:t>
+            </a:r>
+            <a:r>
+              <a:rPr lang="sk-SK" dirty="0"/>
+              <a:t> longer time</a:t>
             </a:r>
             <a:endParaRPr lang="en-GB" dirty="0"/>
           </a:p>
@@ -8156,56 +7686,18 @@
           <a:lstStyle/>
           <a:p>
             <a:r>
-              <a:rPr lang="sk-SK" dirty="0" err="1" smtClean="0"/>
+              <a:rPr lang="sk-SK" dirty="0" err="1"/>
               <a:t>Prolonged</a:t>
             </a:r>
             <a:r>
-              <a:rPr lang="sk-SK" dirty="0" smtClean="0"/>
+              <a:rPr lang="sk-SK" dirty="0"/>
               <a:t> </a:t>
             </a:r>
             <a:r>
-              <a:rPr lang="sk-SK" dirty="0" err="1" smtClean="0"/>
+              <a:rPr lang="sk-SK" dirty="0" err="1"/>
               <a:t>drops</a:t>
             </a:r>
             <a:endParaRPr lang="en-GB" dirty="0"/>
-          </a:p>
-        </p:txBody>
-      </p:sp>
-      <p:sp>
-        <p:nvSpPr>
-          <p:cNvPr id="4" name="BlokTextu 3"/>
-          <p:cNvSpPr txBox="1"/>
-          <p:nvPr/>
-        </p:nvSpPr>
-        <p:spPr>
-          <a:xfrm>
-            <a:off x="7956376" y="4371950"/>
-            <a:ext cx="1008112" cy="307777"/>
-          </a:xfrm>
-          <a:prstGeom prst="rect">
-            <a:avLst/>
-          </a:prstGeom>
-          <a:noFill/>
-        </p:spPr>
-        <p:txBody>
-          <a:bodyPr wrap="square" rtlCol="0">
-            <a:spAutoFit/>
-          </a:bodyPr>
-          <a:lstStyle/>
-          <a:p>
-            <a:r>
-              <a:rPr lang="sk-SK" dirty="0" err="1" smtClean="0">
-                <a:solidFill>
-                  <a:srgbClr val="FF0000"/>
-                </a:solidFill>
-              </a:rPr>
-              <a:t>Stepan</a:t>
-            </a:r>
-            <a:endParaRPr lang="en-GB" dirty="0">
-              <a:solidFill>
-                <a:srgbClr val="FF0000"/>
-              </a:solidFill>
-            </a:endParaRPr>
           </a:p>
         </p:txBody>
       </p:sp>
@@ -8225,7 +7717,7 @@
         </p:blipFill>
         <p:spPr>
           <a:xfrm>
-            <a:off x="1403648" y="1635646"/>
+            <a:off x="1763688" y="1635646"/>
             <a:ext cx="5846424" cy="3507854"/>
           </a:xfrm>
           <a:prstGeom prst="rect">
@@ -8238,13 +7730,6 @@
   <p:clrMapOvr>
     <a:masterClrMapping/>
   </p:clrMapOvr>
-  <p:timing>
-    <p:tnLst>
-      <p:par>
-        <p:cTn id="1" dur="indefinite" restart="never" nodeType="tmRoot"/>
-      </p:par>
-    </p:tnLst>
-  </p:timing>
 </p:sld>
 </file>
 
@@ -8286,38 +7771,37 @@
           <a:lstStyle/>
           <a:p>
             <a:r>
-              <a:rPr lang="en-GB" dirty="0" smtClean="0"/>
+              <a:rPr lang="en-GB" dirty="0"/>
               <a:t>Suspiciously high volatility when compared to similar times</a:t>
             </a:r>
             <a:r>
-              <a:rPr lang="sk-SK" dirty="0" smtClean="0"/>
+              <a:rPr lang="sk-SK" dirty="0"/>
               <a:t> </a:t>
             </a:r>
             <a:r>
-              <a:rPr lang="sk-SK" dirty="0" err="1" smtClean="0"/>
+              <a:rPr lang="sk-SK" dirty="0" err="1"/>
               <a:t>of</a:t>
             </a:r>
             <a:r>
-              <a:rPr lang="sk-SK" dirty="0" smtClean="0"/>
+              <a:rPr lang="sk-SK" dirty="0"/>
               <a:t> </a:t>
             </a:r>
             <a:r>
-              <a:rPr lang="sk-SK" dirty="0" err="1" smtClean="0"/>
+              <a:rPr lang="sk-SK" dirty="0" err="1"/>
               <a:t>day</a:t>
             </a:r>
             <a:r>
-              <a:rPr lang="en-GB" dirty="0" smtClean="0"/>
+              <a:rPr lang="en-GB" dirty="0"/>
               <a:t> </a:t>
             </a:r>
             <a:r>
-              <a:rPr lang="sk-SK" dirty="0" smtClean="0"/>
+              <a:rPr lang="sk-SK" dirty="0"/>
               <a:t>on</a:t>
             </a:r>
             <a:r>
-              <a:rPr lang="en-GB" dirty="0" smtClean="0"/>
+              <a:rPr lang="en-GB" dirty="0"/>
               <a:t> different days</a:t>
             </a:r>
-            <a:endParaRPr lang="en-GB" dirty="0"/>
           </a:p>
         </p:txBody>
       </p:sp>
@@ -8337,15 +7821,15 @@
           <a:lstStyle/>
           <a:p>
             <a:r>
-              <a:rPr lang="sk-SK" dirty="0" err="1" smtClean="0"/>
+              <a:rPr lang="sk-SK" dirty="0" err="1"/>
               <a:t>Heightened</a:t>
             </a:r>
             <a:r>
-              <a:rPr lang="sk-SK" dirty="0" smtClean="0"/>
+              <a:rPr lang="sk-SK" dirty="0"/>
               <a:t> </a:t>
             </a:r>
             <a:r>
-              <a:rPr lang="sk-SK" dirty="0" err="1" smtClean="0"/>
+              <a:rPr lang="sk-SK" dirty="0" err="1"/>
               <a:t>volatility</a:t>
             </a:r>
             <a:endParaRPr lang="en-GB" dirty="0"/>
@@ -8405,13 +7889,6 @@
   <p:clrMapOvr>
     <a:masterClrMapping/>
   </p:clrMapOvr>
-  <p:timing>
-    <p:tnLst>
-      <p:par>
-        <p:cTn id="1" dur="indefinite" restart="never" nodeType="tmRoot"/>
-      </p:par>
-    </p:tnLst>
-  </p:timing>
 </p:sld>
 </file>
 

</xml_diff>